<commit_message>
terminado de documento de descripcion
</commit_message>
<xml_diff>
--- a/docs/Sistema de mesa de ayuda o help-desk.pptx
+++ b/docs/Sistema de mesa de ayuda o help-desk.pptx
@@ -5,7 +5,7 @@
     <p:sldMasterId id="2147483660" r:id="rId1"/>
   </p:sldMasterIdLst>
   <p:notesMasterIdLst>
-    <p:notesMasterId r:id="rId12"/>
+    <p:notesMasterId r:id="rId17"/>
   </p:notesMasterIdLst>
   <p:sldIdLst>
     <p:sldId id="256" r:id="rId2"/>
@@ -17,7 +17,12 @@
     <p:sldId id="262" r:id="rId8"/>
     <p:sldId id="263" r:id="rId9"/>
     <p:sldId id="264" r:id="rId10"/>
-    <p:sldId id="265" r:id="rId11"/>
+    <p:sldId id="267" r:id="rId11"/>
+    <p:sldId id="266" r:id="rId12"/>
+    <p:sldId id="268" r:id="rId13"/>
+    <p:sldId id="269" r:id="rId14"/>
+    <p:sldId id="270" r:id="rId15"/>
+    <p:sldId id="265" r:id="rId16"/>
   </p:sldIdLst>
   <p:sldSz cx="12192000" cy="6858000"/>
   <p:notesSz cx="6858000" cy="9144000"/>
@@ -116,6 +121,11 @@
       </a:defRPr>
     </a:lvl9pPr>
   </p:defaultTextStyle>
+  <p:extLst>
+    <p:ext uri="{EFAFB233-063F-42B5-8137-9DF3F51BA10A}">
+      <p15:sldGuideLst xmlns:p15="http://schemas.microsoft.com/office/powerpoint/2012/main"/>
+    </p:ext>
+  </p:extLst>
 </p:presentation>
 </file>
 
@@ -201,7 +211,7 @@
           <a:p>
             <a:fld id="{BE22F995-A106-47C5-8769-B89B1D2B1241}" type="datetimeFigureOut">
               <a:rPr lang="es-MX" smtClean="0"/>
-              <a:t>06/08/2021</a:t>
+              <a:t>08/08/2021</a:t>
             </a:fld>
             <a:endParaRPr lang="es-MX"/>
           </a:p>
@@ -265,35 +275,35 @@
           <a:p>
             <a:pPr lvl="0"/>
             <a:r>
-              <a:rPr lang="es-ES" smtClean="0"/>
+              <a:rPr lang="es-ES"/>
               <a:t>Editar el estilo de texto del patrón</a:t>
             </a:r>
           </a:p>
           <a:p>
             <a:pPr lvl="1"/>
             <a:r>
-              <a:rPr lang="es-ES" smtClean="0"/>
+              <a:rPr lang="es-ES"/>
               <a:t>Segundo nivel</a:t>
             </a:r>
           </a:p>
           <a:p>
             <a:pPr lvl="2"/>
             <a:r>
-              <a:rPr lang="es-ES" smtClean="0"/>
+              <a:rPr lang="es-ES"/>
               <a:t>Tercer nivel</a:t>
             </a:r>
           </a:p>
           <a:p>
             <a:pPr lvl="3"/>
             <a:r>
-              <a:rPr lang="es-ES" smtClean="0"/>
+              <a:rPr lang="es-ES"/>
               <a:t>Cuarto nivel</a:t>
             </a:r>
           </a:p>
           <a:p>
             <a:pPr lvl="4"/>
             <a:r>
-              <a:rPr lang="es-ES" smtClean="0"/>
+              <a:rPr lang="es-ES"/>
               <a:t>Quinto nivel</a:t>
             </a:r>
             <a:endParaRPr lang="es-MX"/>
@@ -595,7 +605,7 @@
           </a:lstStyle>
           <a:p>
             <a:r>
-              <a:rPr lang="es-ES" smtClean="0"/>
+              <a:rPr lang="es-ES"/>
               <a:t>Haga clic para modificar el estilo de título del patrón</a:t>
             </a:r>
             <a:endParaRPr lang="en-US" dirty="0"/>
@@ -669,7 +679,7 @@
           </a:lstStyle>
           <a:p>
             <a:r>
-              <a:rPr lang="es-ES" smtClean="0"/>
+              <a:rPr lang="es-ES"/>
               <a:t>Haga clic para editar el estilo de subtítulo del patrón</a:t>
             </a:r>
             <a:endParaRPr lang="en-US" dirty="0"/>
@@ -693,7 +703,7 @@
           <a:p>
             <a:fld id="{BD5BB371-1387-4BAA-BACB-DE370B9C36CF}" type="datetimeFigureOut">
               <a:rPr lang="es-MX" smtClean="0"/>
-              <a:t>06/08/2021</a:t>
+              <a:t>08/08/2021</a:t>
             </a:fld>
             <a:endParaRPr lang="es-MX"/>
           </a:p>
@@ -787,7 +797,7 @@
           <a:lstStyle/>
           <a:p>
             <a:r>
-              <a:rPr lang="es-ES" smtClean="0"/>
+              <a:rPr lang="es-ES"/>
               <a:t>Haga clic para modificar el estilo de título del patrón</a:t>
             </a:r>
             <a:endParaRPr lang="en-US" dirty="0"/>
@@ -811,35 +821,35 @@
           <a:p>
             <a:pPr lvl="0"/>
             <a:r>
-              <a:rPr lang="es-ES" smtClean="0"/>
+              <a:rPr lang="es-ES"/>
               <a:t>Editar el estilo de texto del patrón</a:t>
             </a:r>
           </a:p>
           <a:p>
             <a:pPr lvl="1"/>
             <a:r>
-              <a:rPr lang="es-ES" smtClean="0"/>
+              <a:rPr lang="es-ES"/>
               <a:t>Segundo nivel</a:t>
             </a:r>
           </a:p>
           <a:p>
             <a:pPr lvl="2"/>
             <a:r>
-              <a:rPr lang="es-ES" smtClean="0"/>
+              <a:rPr lang="es-ES"/>
               <a:t>Tercer nivel</a:t>
             </a:r>
           </a:p>
           <a:p>
             <a:pPr lvl="3"/>
             <a:r>
-              <a:rPr lang="es-ES" smtClean="0"/>
+              <a:rPr lang="es-ES"/>
               <a:t>Cuarto nivel</a:t>
             </a:r>
           </a:p>
           <a:p>
             <a:pPr lvl="4"/>
             <a:r>
-              <a:rPr lang="es-ES" smtClean="0"/>
+              <a:rPr lang="es-ES"/>
               <a:t>Quinto nivel</a:t>
             </a:r>
             <a:endParaRPr lang="en-US" dirty="0"/>
@@ -863,7 +873,7 @@
           <a:p>
             <a:fld id="{BD5BB371-1387-4BAA-BACB-DE370B9C36CF}" type="datetimeFigureOut">
               <a:rPr lang="es-MX" smtClean="0"/>
-              <a:t>06/08/2021</a:t>
+              <a:t>08/08/2021</a:t>
             </a:fld>
             <a:endParaRPr lang="es-MX"/>
           </a:p>
@@ -962,7 +972,7 @@
           <a:lstStyle/>
           <a:p>
             <a:r>
-              <a:rPr lang="es-ES" smtClean="0"/>
+              <a:rPr lang="es-ES"/>
               <a:t>Haga clic para modificar el estilo de título del patrón</a:t>
             </a:r>
             <a:endParaRPr lang="en-US" dirty="0"/>
@@ -991,35 +1001,35 @@
           <a:p>
             <a:pPr lvl="0"/>
             <a:r>
-              <a:rPr lang="es-ES" smtClean="0"/>
+              <a:rPr lang="es-ES"/>
               <a:t>Editar el estilo de texto del patrón</a:t>
             </a:r>
           </a:p>
           <a:p>
             <a:pPr lvl="1"/>
             <a:r>
-              <a:rPr lang="es-ES" smtClean="0"/>
+              <a:rPr lang="es-ES"/>
               <a:t>Segundo nivel</a:t>
             </a:r>
           </a:p>
           <a:p>
             <a:pPr lvl="2"/>
             <a:r>
-              <a:rPr lang="es-ES" smtClean="0"/>
+              <a:rPr lang="es-ES"/>
               <a:t>Tercer nivel</a:t>
             </a:r>
           </a:p>
           <a:p>
             <a:pPr lvl="3"/>
             <a:r>
-              <a:rPr lang="es-ES" smtClean="0"/>
+              <a:rPr lang="es-ES"/>
               <a:t>Cuarto nivel</a:t>
             </a:r>
           </a:p>
           <a:p>
             <a:pPr lvl="4"/>
             <a:r>
-              <a:rPr lang="es-ES" smtClean="0"/>
+              <a:rPr lang="es-ES"/>
               <a:t>Quinto nivel</a:t>
             </a:r>
             <a:endParaRPr lang="en-US" dirty="0"/>
@@ -1043,7 +1053,7 @@
           <a:p>
             <a:fld id="{BD5BB371-1387-4BAA-BACB-DE370B9C36CF}" type="datetimeFigureOut">
               <a:rPr lang="es-MX" smtClean="0"/>
-              <a:t>06/08/2021</a:t>
+              <a:t>08/08/2021</a:t>
             </a:fld>
             <a:endParaRPr lang="es-MX"/>
           </a:p>
@@ -1137,7 +1147,7 @@
           <a:lstStyle/>
           <a:p>
             <a:r>
-              <a:rPr lang="es-ES" smtClean="0"/>
+              <a:rPr lang="es-ES"/>
               <a:t>Haga clic para modificar el estilo de título del patrón</a:t>
             </a:r>
             <a:endParaRPr lang="en-US" dirty="0"/>
@@ -1161,35 +1171,35 @@
           <a:p>
             <a:pPr lvl="0"/>
             <a:r>
-              <a:rPr lang="es-ES" smtClean="0"/>
+              <a:rPr lang="es-ES"/>
               <a:t>Editar el estilo de texto del patrón</a:t>
             </a:r>
           </a:p>
           <a:p>
             <a:pPr lvl="1"/>
             <a:r>
-              <a:rPr lang="es-ES" smtClean="0"/>
+              <a:rPr lang="es-ES"/>
               <a:t>Segundo nivel</a:t>
             </a:r>
           </a:p>
           <a:p>
             <a:pPr lvl="2"/>
             <a:r>
-              <a:rPr lang="es-ES" smtClean="0"/>
+              <a:rPr lang="es-ES"/>
               <a:t>Tercer nivel</a:t>
             </a:r>
           </a:p>
           <a:p>
             <a:pPr lvl="3"/>
             <a:r>
-              <a:rPr lang="es-ES" smtClean="0"/>
+              <a:rPr lang="es-ES"/>
               <a:t>Cuarto nivel</a:t>
             </a:r>
           </a:p>
           <a:p>
             <a:pPr lvl="4"/>
             <a:r>
-              <a:rPr lang="es-ES" smtClean="0"/>
+              <a:rPr lang="es-ES"/>
               <a:t>Quinto nivel</a:t>
             </a:r>
             <a:endParaRPr lang="en-US" dirty="0"/>
@@ -1213,7 +1223,7 @@
           <a:p>
             <a:fld id="{BD5BB371-1387-4BAA-BACB-DE370B9C36CF}" type="datetimeFigureOut">
               <a:rPr lang="es-MX" smtClean="0"/>
-              <a:t>06/08/2021</a:t>
+              <a:t>08/08/2021</a:t>
             </a:fld>
             <a:endParaRPr lang="es-MX"/>
           </a:p>
@@ -1325,7 +1335,7 @@
           </a:lstStyle>
           <a:p>
             <a:r>
-              <a:rPr lang="es-ES" smtClean="0"/>
+              <a:rPr lang="es-ES"/>
               <a:t>Haga clic para modificar el estilo de título del patrón</a:t>
             </a:r>
             <a:endParaRPr lang="en-US" dirty="0"/>
@@ -1448,7 +1458,7 @@
           <a:p>
             <a:pPr lvl="0"/>
             <a:r>
-              <a:rPr lang="es-ES" smtClean="0"/>
+              <a:rPr lang="es-ES"/>
               <a:t>Editar el estilo de texto del patrón</a:t>
             </a:r>
           </a:p>
@@ -1471,7 +1481,7 @@
           <a:p>
             <a:fld id="{BD5BB371-1387-4BAA-BACB-DE370B9C36CF}" type="datetimeFigureOut">
               <a:rPr lang="es-MX" smtClean="0"/>
-              <a:t>06/08/2021</a:t>
+              <a:t>08/08/2021</a:t>
             </a:fld>
             <a:endParaRPr lang="es-MX"/>
           </a:p>
@@ -1565,7 +1575,7 @@
           <a:lstStyle/>
           <a:p>
             <a:r>
-              <a:rPr lang="es-ES" smtClean="0"/>
+              <a:rPr lang="es-ES"/>
               <a:t>Haga clic para modificar el estilo de título del patrón</a:t>
             </a:r>
             <a:endParaRPr lang="en-US" dirty="0"/>
@@ -1622,35 +1632,35 @@
           <a:p>
             <a:pPr lvl="0"/>
             <a:r>
-              <a:rPr lang="es-ES" smtClean="0"/>
+              <a:rPr lang="es-ES"/>
               <a:t>Editar el estilo de texto del patrón</a:t>
             </a:r>
           </a:p>
           <a:p>
             <a:pPr lvl="1"/>
             <a:r>
-              <a:rPr lang="es-ES" smtClean="0"/>
+              <a:rPr lang="es-ES"/>
               <a:t>Segundo nivel</a:t>
             </a:r>
           </a:p>
           <a:p>
             <a:pPr lvl="2"/>
             <a:r>
-              <a:rPr lang="es-ES" smtClean="0"/>
+              <a:rPr lang="es-ES"/>
               <a:t>Tercer nivel</a:t>
             </a:r>
           </a:p>
           <a:p>
             <a:pPr lvl="3"/>
             <a:r>
-              <a:rPr lang="es-ES" smtClean="0"/>
+              <a:rPr lang="es-ES"/>
               <a:t>Cuarto nivel</a:t>
             </a:r>
           </a:p>
           <a:p>
             <a:pPr lvl="4"/>
             <a:r>
-              <a:rPr lang="es-ES" smtClean="0"/>
+              <a:rPr lang="es-ES"/>
               <a:t>Quinto nivel</a:t>
             </a:r>
             <a:endParaRPr lang="en-US" dirty="0"/>
@@ -1707,35 +1717,35 @@
           <a:p>
             <a:pPr lvl="0"/>
             <a:r>
-              <a:rPr lang="es-ES" smtClean="0"/>
+              <a:rPr lang="es-ES"/>
               <a:t>Editar el estilo de texto del patrón</a:t>
             </a:r>
           </a:p>
           <a:p>
             <a:pPr lvl="1"/>
             <a:r>
-              <a:rPr lang="es-ES" smtClean="0"/>
+              <a:rPr lang="es-ES"/>
               <a:t>Segundo nivel</a:t>
             </a:r>
           </a:p>
           <a:p>
             <a:pPr lvl="2"/>
             <a:r>
-              <a:rPr lang="es-ES" smtClean="0"/>
+              <a:rPr lang="es-ES"/>
               <a:t>Tercer nivel</a:t>
             </a:r>
           </a:p>
           <a:p>
             <a:pPr lvl="3"/>
             <a:r>
-              <a:rPr lang="es-ES" smtClean="0"/>
+              <a:rPr lang="es-ES"/>
               <a:t>Cuarto nivel</a:t>
             </a:r>
           </a:p>
           <a:p>
             <a:pPr lvl="4"/>
             <a:r>
-              <a:rPr lang="es-ES" smtClean="0"/>
+              <a:rPr lang="es-ES"/>
               <a:t>Quinto nivel</a:t>
             </a:r>
             <a:endParaRPr lang="en-US" dirty="0"/>
@@ -1759,7 +1769,7 @@
           <a:p>
             <a:fld id="{BD5BB371-1387-4BAA-BACB-DE370B9C36CF}" type="datetimeFigureOut">
               <a:rPr lang="es-MX" smtClean="0"/>
-              <a:t>06/08/2021</a:t>
+              <a:t>08/08/2021</a:t>
             </a:fld>
             <a:endParaRPr lang="es-MX"/>
           </a:p>
@@ -1853,7 +1863,7 @@
           <a:lstStyle/>
           <a:p>
             <a:r>
-              <a:rPr lang="es-ES" smtClean="0"/>
+              <a:rPr lang="es-ES"/>
               <a:t>Haga clic para modificar el estilo de título del patrón</a:t>
             </a:r>
             <a:endParaRPr lang="en-US" dirty="0"/>
@@ -1931,7 +1941,7 @@
           <a:p>
             <a:pPr lvl="0"/>
             <a:r>
-              <a:rPr lang="es-ES" smtClean="0"/>
+              <a:rPr lang="es-ES"/>
               <a:t>Editar el estilo de texto del patrón</a:t>
             </a:r>
           </a:p>
@@ -1987,35 +1997,35 @@
           <a:p>
             <a:pPr lvl="0"/>
             <a:r>
-              <a:rPr lang="es-ES" smtClean="0"/>
+              <a:rPr lang="es-ES"/>
               <a:t>Editar el estilo de texto del patrón</a:t>
             </a:r>
           </a:p>
           <a:p>
             <a:pPr lvl="1"/>
             <a:r>
-              <a:rPr lang="es-ES" smtClean="0"/>
+              <a:rPr lang="es-ES"/>
               <a:t>Segundo nivel</a:t>
             </a:r>
           </a:p>
           <a:p>
             <a:pPr lvl="2"/>
             <a:r>
-              <a:rPr lang="es-ES" smtClean="0"/>
+              <a:rPr lang="es-ES"/>
               <a:t>Tercer nivel</a:t>
             </a:r>
           </a:p>
           <a:p>
             <a:pPr lvl="3"/>
             <a:r>
-              <a:rPr lang="es-ES" smtClean="0"/>
+              <a:rPr lang="es-ES"/>
               <a:t>Cuarto nivel</a:t>
             </a:r>
           </a:p>
           <a:p>
             <a:pPr lvl="4"/>
             <a:r>
-              <a:rPr lang="es-ES" smtClean="0"/>
+              <a:rPr lang="es-ES"/>
               <a:t>Quinto nivel</a:t>
             </a:r>
             <a:endParaRPr lang="en-US" dirty="0"/>
@@ -2093,7 +2103,7 @@
           <a:p>
             <a:pPr lvl="0"/>
             <a:r>
-              <a:rPr lang="es-ES" smtClean="0"/>
+              <a:rPr lang="es-ES"/>
               <a:t>Editar el estilo de texto del patrón</a:t>
             </a:r>
           </a:p>
@@ -2149,35 +2159,35 @@
           <a:p>
             <a:pPr lvl="0"/>
             <a:r>
-              <a:rPr lang="es-ES" smtClean="0"/>
+              <a:rPr lang="es-ES"/>
               <a:t>Editar el estilo de texto del patrón</a:t>
             </a:r>
           </a:p>
           <a:p>
             <a:pPr lvl="1"/>
             <a:r>
-              <a:rPr lang="es-ES" smtClean="0"/>
+              <a:rPr lang="es-ES"/>
               <a:t>Segundo nivel</a:t>
             </a:r>
           </a:p>
           <a:p>
             <a:pPr lvl="2"/>
             <a:r>
-              <a:rPr lang="es-ES" smtClean="0"/>
+              <a:rPr lang="es-ES"/>
               <a:t>Tercer nivel</a:t>
             </a:r>
           </a:p>
           <a:p>
             <a:pPr lvl="3"/>
             <a:r>
-              <a:rPr lang="es-ES" smtClean="0"/>
+              <a:rPr lang="es-ES"/>
               <a:t>Cuarto nivel</a:t>
             </a:r>
           </a:p>
           <a:p>
             <a:pPr lvl="4"/>
             <a:r>
-              <a:rPr lang="es-ES" smtClean="0"/>
+              <a:rPr lang="es-ES"/>
               <a:t>Quinto nivel</a:t>
             </a:r>
             <a:endParaRPr lang="en-US" dirty="0"/>
@@ -2201,7 +2211,7 @@
           <a:p>
             <a:fld id="{BD5BB371-1387-4BAA-BACB-DE370B9C36CF}" type="datetimeFigureOut">
               <a:rPr lang="es-MX" smtClean="0"/>
-              <a:t>06/08/2021</a:t>
+              <a:t>08/08/2021</a:t>
             </a:fld>
             <a:endParaRPr lang="es-MX"/>
           </a:p>
@@ -2295,7 +2305,7 @@
           <a:lstStyle/>
           <a:p>
             <a:r>
-              <a:rPr lang="es-ES" smtClean="0"/>
+              <a:rPr lang="es-ES"/>
               <a:t>Haga clic para modificar el estilo de título del patrón</a:t>
             </a:r>
             <a:endParaRPr lang="en-US" dirty="0"/>
@@ -2319,7 +2329,7 @@
           <a:p>
             <a:fld id="{BD5BB371-1387-4BAA-BACB-DE370B9C36CF}" type="datetimeFigureOut">
               <a:rPr lang="es-MX" smtClean="0"/>
-              <a:t>06/08/2021</a:t>
+              <a:t>08/08/2021</a:t>
             </a:fld>
             <a:endParaRPr lang="es-MX"/>
           </a:p>
@@ -2414,7 +2424,7 @@
           <a:p>
             <a:fld id="{BD5BB371-1387-4BAA-BACB-DE370B9C36CF}" type="datetimeFigureOut">
               <a:rPr lang="es-MX" smtClean="0"/>
-              <a:t>06/08/2021</a:t>
+              <a:t>08/08/2021</a:t>
             </a:fld>
             <a:endParaRPr lang="es-MX"/>
           </a:p>
@@ -2519,7 +2529,7 @@
           </a:lstStyle>
           <a:p>
             <a:r>
-              <a:rPr lang="es-ES" smtClean="0"/>
+              <a:rPr lang="es-ES"/>
               <a:t>Haga clic para modificar el estilo de título del patrón</a:t>
             </a:r>
             <a:endParaRPr lang="en-US" dirty="0"/>
@@ -2576,35 +2586,35 @@
           <a:p>
             <a:pPr lvl="0"/>
             <a:r>
-              <a:rPr lang="es-ES" smtClean="0"/>
+              <a:rPr lang="es-ES"/>
               <a:t>Editar el estilo de texto del patrón</a:t>
             </a:r>
           </a:p>
           <a:p>
             <a:pPr lvl="1"/>
             <a:r>
-              <a:rPr lang="es-ES" smtClean="0"/>
+              <a:rPr lang="es-ES"/>
               <a:t>Segundo nivel</a:t>
             </a:r>
           </a:p>
           <a:p>
             <a:pPr lvl="2"/>
             <a:r>
-              <a:rPr lang="es-ES" smtClean="0"/>
+              <a:rPr lang="es-ES"/>
               <a:t>Tercer nivel</a:t>
             </a:r>
           </a:p>
           <a:p>
             <a:pPr lvl="3"/>
             <a:r>
-              <a:rPr lang="es-ES" smtClean="0"/>
+              <a:rPr lang="es-ES"/>
               <a:t>Cuarto nivel</a:t>
             </a:r>
           </a:p>
           <a:p>
             <a:pPr lvl="4"/>
             <a:r>
-              <a:rPr lang="es-ES" smtClean="0"/>
+              <a:rPr lang="es-ES"/>
               <a:t>Quinto nivel</a:t>
             </a:r>
             <a:endParaRPr lang="en-US" dirty="0"/>
@@ -2679,7 +2689,7 @@
           <a:p>
             <a:pPr lvl="0"/>
             <a:r>
-              <a:rPr lang="es-ES" smtClean="0"/>
+              <a:rPr lang="es-ES"/>
               <a:t>Editar el estilo de texto del patrón</a:t>
             </a:r>
           </a:p>
@@ -2702,7 +2712,7 @@
           <a:p>
             <a:fld id="{BD5BB371-1387-4BAA-BACB-DE370B9C36CF}" type="datetimeFigureOut">
               <a:rPr lang="es-MX" smtClean="0"/>
-              <a:t>06/08/2021</a:t>
+              <a:t>08/08/2021</a:t>
             </a:fld>
             <a:endParaRPr lang="es-MX"/>
           </a:p>
@@ -2807,7 +2817,7 @@
           </a:lstStyle>
           <a:p>
             <a:r>
-              <a:rPr lang="es-ES" smtClean="0"/>
+              <a:rPr lang="es-ES"/>
               <a:t>Haga clic para modificar el estilo de título del patrón</a:t>
             </a:r>
             <a:endParaRPr lang="en-US" dirty="0"/>
@@ -2877,7 +2887,7 @@
           </a:lstStyle>
           <a:p>
             <a:r>
-              <a:rPr lang="es-ES" smtClean="0"/>
+              <a:rPr lang="es-ES"/>
               <a:t>Haga clic en el icono para agregar una imagen</a:t>
             </a:r>
             <a:endParaRPr lang="en-US" dirty="0"/>
@@ -2952,7 +2962,7 @@
           <a:p>
             <a:pPr lvl="0"/>
             <a:r>
-              <a:rPr lang="es-ES" smtClean="0"/>
+              <a:rPr lang="es-ES"/>
               <a:t>Editar el estilo de texto del patrón</a:t>
             </a:r>
           </a:p>
@@ -2975,7 +2985,7 @@
           <a:p>
             <a:fld id="{BD5BB371-1387-4BAA-BACB-DE370B9C36CF}" type="datetimeFigureOut">
               <a:rPr lang="es-MX" smtClean="0"/>
-              <a:t>06/08/2021</a:t>
+              <a:t>08/08/2021</a:t>
             </a:fld>
             <a:endParaRPr lang="es-MX"/>
           </a:p>
@@ -3127,7 +3137,7 @@
           <a:lstStyle/>
           <a:p>
             <a:r>
-              <a:rPr lang="es-ES" smtClean="0"/>
+              <a:rPr lang="es-ES"/>
               <a:t>Haga clic para modificar el estilo de título del patrón</a:t>
             </a:r>
             <a:endParaRPr lang="en-US" dirty="0"/>
@@ -3201,35 +3211,35 @@
           <a:p>
             <a:pPr lvl="0"/>
             <a:r>
-              <a:rPr lang="es-ES" smtClean="0"/>
+              <a:rPr lang="es-ES"/>
               <a:t>Editar el estilo de texto del patrón</a:t>
             </a:r>
           </a:p>
           <a:p>
             <a:pPr lvl="1"/>
             <a:r>
-              <a:rPr lang="es-ES" smtClean="0"/>
+              <a:rPr lang="es-ES"/>
               <a:t>Segundo nivel</a:t>
             </a:r>
           </a:p>
           <a:p>
             <a:pPr lvl="2"/>
             <a:r>
-              <a:rPr lang="es-ES" smtClean="0"/>
+              <a:rPr lang="es-ES"/>
               <a:t>Tercer nivel</a:t>
             </a:r>
           </a:p>
           <a:p>
             <a:pPr lvl="3"/>
             <a:r>
-              <a:rPr lang="es-ES" smtClean="0"/>
+              <a:rPr lang="es-ES"/>
               <a:t>Cuarto nivel</a:t>
             </a:r>
           </a:p>
           <a:p>
             <a:pPr lvl="4"/>
             <a:r>
-              <a:rPr lang="es-ES" smtClean="0"/>
+              <a:rPr lang="es-ES"/>
               <a:t>Quinto nivel</a:t>
             </a:r>
             <a:endParaRPr lang="en-US" dirty="0"/>
@@ -3272,7 +3282,7 @@
           <a:p>
             <a:fld id="{BD5BB371-1387-4BAA-BACB-DE370B9C36CF}" type="datetimeFigureOut">
               <a:rPr lang="es-MX" smtClean="0"/>
-              <a:t>06/08/2021</a:t>
+              <a:t>08/08/2021</a:t>
             </a:fld>
             <a:endParaRPr lang="es-MX"/>
           </a:p>
@@ -3770,11 +3780,11 @@
           <a:lstStyle/>
           <a:p>
             <a:r>
-              <a:rPr lang="es-MX" dirty="0" smtClean="0"/>
+              <a:rPr lang="es-MX" dirty="0"/>
               <a:t>Sistema de mesa de ayuda o </a:t>
             </a:r>
             <a:r>
-              <a:rPr lang="es-MX" dirty="0" err="1" smtClean="0"/>
+              <a:rPr lang="es-MX" dirty="0" err="1"/>
               <a:t>help-desk</a:t>
             </a:r>
             <a:endParaRPr lang="es-MX" dirty="0"/>
@@ -3797,31 +3807,27 @@
           <a:lstStyle/>
           <a:p>
             <a:r>
-              <a:rPr lang="es-MX" dirty="0" smtClean="0"/>
+              <a:rPr lang="es-MX" dirty="0"/>
               <a:t>Desarrollo con PHP, </a:t>
             </a:r>
             <a:r>
-              <a:rPr lang="es-MX" dirty="0" err="1" smtClean="0"/>
+              <a:rPr lang="es-MX" dirty="0" err="1"/>
               <a:t>Bootstrap</a:t>
             </a:r>
             <a:r>
-              <a:rPr lang="es-MX" dirty="0" smtClean="0"/>
+              <a:rPr lang="es-MX" dirty="0"/>
               <a:t> 4, </a:t>
             </a:r>
             <a:r>
-              <a:rPr lang="es-MX" dirty="0" err="1" smtClean="0"/>
+              <a:rPr lang="es-MX" dirty="0" err="1"/>
               <a:t>jQuery</a:t>
             </a:r>
             <a:r>
               <a:rPr lang="es-MX" dirty="0"/>
-              <a:t> </a:t>
-            </a:r>
-            <a:r>
-              <a:rPr lang="es-MX" dirty="0" smtClean="0"/>
-              <a:t>y </a:t>
-            </a:r>
-            <a:r>
-              <a:rPr lang="es-MX" dirty="0" err="1" smtClean="0"/>
+              <a:t> y </a:t>
+            </a:r>
+            <a:r>
+              <a:rPr lang="es-MX" dirty="0" err="1"/>
               <a:t>MySQL</a:t>
             </a:r>
             <a:endParaRPr lang="es-MX" dirty="0"/>
@@ -3890,6 +3896,1641 @@
       </p:grpSpPr>
       <p:sp>
         <p:nvSpPr>
+          <p:cNvPr id="2" name="Título 1">
+            <a:extLst>
+              <a:ext uri="{FF2B5EF4-FFF2-40B4-BE49-F238E27FC236}">
+                <a16:creationId xmlns:a16="http://schemas.microsoft.com/office/drawing/2014/main" id="{BA6E6818-852C-47B3-9A85-9E59B615C79D}"/>
+              </a:ext>
+            </a:extLst>
+          </p:cNvPr>
+          <p:cNvSpPr>
+            <a:spLocks noGrp="1"/>
+          </p:cNvSpPr>
+          <p:nvPr>
+            <p:ph type="title"/>
+          </p:nvPr>
+        </p:nvSpPr>
+        <p:spPr/>
+        <p:txBody>
+          <a:bodyPr/>
+          <a:lstStyle/>
+          <a:p>
+            <a:r>
+              <a:rPr lang="es-MX" dirty="0"/>
+              <a:t>Cliente </a:t>
+            </a:r>
+            <a:br>
+              <a:rPr lang="es-MX" dirty="0"/>
+            </a:br>
+            <a:r>
+              <a:rPr lang="es-MX" dirty="0"/>
+              <a:t>- Inicio </a:t>
+            </a:r>
+          </a:p>
+        </p:txBody>
+      </p:sp>
+      <p:sp>
+        <p:nvSpPr>
+          <p:cNvPr id="3" name="Marcador de contenido 2">
+            <a:extLst>
+              <a:ext uri="{FF2B5EF4-FFF2-40B4-BE49-F238E27FC236}">
+                <a16:creationId xmlns:a16="http://schemas.microsoft.com/office/drawing/2014/main" id="{72CA8DB8-5D2F-424A-91FB-E1EA9DD6A11B}"/>
+              </a:ext>
+            </a:extLst>
+          </p:cNvPr>
+          <p:cNvSpPr>
+            <a:spLocks noGrp="1"/>
+          </p:cNvSpPr>
+          <p:nvPr>
+            <p:ph idx="1"/>
+          </p:nvPr>
+        </p:nvSpPr>
+        <p:spPr/>
+        <p:txBody>
+          <a:bodyPr/>
+          <a:lstStyle/>
+          <a:p>
+            <a:r>
+              <a:rPr lang="es-MX" dirty="0"/>
+              <a:t>En el inicio de sesión del usuario , se agregara una vista de sus datos, su imagen si existe y un mensaje de bienvenida, con el tiempo se puede </a:t>
+            </a:r>
+            <a:r>
+              <a:rPr lang="es-MX" dirty="0" err="1"/>
+              <a:t>cuztumizar</a:t>
+            </a:r>
+            <a:r>
+              <a:rPr lang="es-MX" dirty="0"/>
+              <a:t> si es necesario.</a:t>
+            </a:r>
+          </a:p>
+        </p:txBody>
+      </p:sp>
+    </p:spTree>
+    <p:extLst>
+      <p:ext uri="{BB962C8B-B14F-4D97-AF65-F5344CB8AC3E}">
+        <p14:creationId xmlns:p14="http://schemas.microsoft.com/office/powerpoint/2010/main" val="3883700617"/>
+      </p:ext>
+    </p:extLst>
+  </p:cSld>
+  <p:clrMapOvr>
+    <a:masterClrMapping/>
+  </p:clrMapOvr>
+</p:sld>
+</file>
+
+<file path=ppt/slides/slide11.xml><?xml version="1.0" encoding="utf-8"?>
+<p:sld xmlns:a="http://schemas.openxmlformats.org/drawingml/2006/main" xmlns:r="http://schemas.openxmlformats.org/officeDocument/2006/relationships" xmlns:p="http://schemas.openxmlformats.org/presentationml/2006/main">
+  <p:cSld>
+    <p:spTree>
+      <p:nvGrpSpPr>
+        <p:cNvPr id="1" name=""/>
+        <p:cNvGrpSpPr/>
+        <p:nvPr/>
+      </p:nvGrpSpPr>
+      <p:grpSpPr>
+        <a:xfrm>
+          <a:off x="0" y="0"/>
+          <a:ext cx="0" cy="0"/>
+          <a:chOff x="0" y="0"/>
+          <a:chExt cx="0" cy="0"/>
+        </a:xfrm>
+      </p:grpSpPr>
+      <p:sp>
+        <p:nvSpPr>
+          <p:cNvPr id="2" name="Título 1">
+            <a:extLst>
+              <a:ext uri="{FF2B5EF4-FFF2-40B4-BE49-F238E27FC236}">
+                <a16:creationId xmlns:a16="http://schemas.microsoft.com/office/drawing/2014/main" id="{E6630201-4668-406F-A000-AA51F154064A}"/>
+              </a:ext>
+            </a:extLst>
+          </p:cNvPr>
+          <p:cNvSpPr>
+            <a:spLocks noGrp="1"/>
+          </p:cNvSpPr>
+          <p:nvPr>
+            <p:ph type="title"/>
+          </p:nvPr>
+        </p:nvSpPr>
+        <p:spPr/>
+        <p:txBody>
+          <a:bodyPr/>
+          <a:lstStyle/>
+          <a:p>
+            <a:pPr algn="ctr"/>
+            <a:r>
+              <a:rPr lang="es-MX" dirty="0"/>
+              <a:t>Cliente </a:t>
+            </a:r>
+            <a:br>
+              <a:rPr lang="es-MX" dirty="0"/>
+            </a:br>
+            <a:r>
+              <a:rPr lang="es-MX" dirty="0"/>
+              <a:t>- Datos personales</a:t>
+            </a:r>
+          </a:p>
+        </p:txBody>
+      </p:sp>
+      <p:sp>
+        <p:nvSpPr>
+          <p:cNvPr id="5" name="Rectángulo 4">
+            <a:extLst>
+              <a:ext uri="{FF2B5EF4-FFF2-40B4-BE49-F238E27FC236}">
+                <a16:creationId xmlns:a16="http://schemas.microsoft.com/office/drawing/2014/main" id="{06DEC5FD-6066-45EE-9D9F-E6C794FFDC89}"/>
+              </a:ext>
+            </a:extLst>
+          </p:cNvPr>
+          <p:cNvSpPr/>
+          <p:nvPr/>
+        </p:nvSpPr>
+        <p:spPr>
+          <a:xfrm>
+            <a:off x="4093827" y="1283516"/>
+            <a:ext cx="6753138" cy="4228051"/>
+          </a:xfrm>
+          <a:prstGeom prst="rect">
+            <a:avLst/>
+          </a:prstGeom>
+        </p:spPr>
+        <p:style>
+          <a:lnRef idx="2">
+            <a:schemeClr val="accent1"/>
+          </a:lnRef>
+          <a:fillRef idx="1">
+            <a:schemeClr val="lt1"/>
+          </a:fillRef>
+          <a:effectRef idx="0">
+            <a:schemeClr val="accent1"/>
+          </a:effectRef>
+          <a:fontRef idx="minor">
+            <a:schemeClr val="dk1"/>
+          </a:fontRef>
+        </p:style>
+        <p:txBody>
+          <a:bodyPr rtlCol="0" anchor="ctr"/>
+          <a:lstStyle/>
+          <a:p>
+            <a:pPr algn="ctr"/>
+            <a:endParaRPr lang="es-MX"/>
+          </a:p>
+        </p:txBody>
+      </p:sp>
+      <p:sp>
+        <p:nvSpPr>
+          <p:cNvPr id="6" name="CuadroTexto 5">
+            <a:extLst>
+              <a:ext uri="{FF2B5EF4-FFF2-40B4-BE49-F238E27FC236}">
+                <a16:creationId xmlns:a16="http://schemas.microsoft.com/office/drawing/2014/main" id="{A771FBAC-0183-4015-80C4-25833C0DBCB3}"/>
+              </a:ext>
+            </a:extLst>
+          </p:cNvPr>
+          <p:cNvSpPr txBox="1"/>
+          <p:nvPr/>
+        </p:nvSpPr>
+        <p:spPr>
+          <a:xfrm>
+            <a:off x="6070814" y="914184"/>
+            <a:ext cx="2799164" cy="369332"/>
+          </a:xfrm>
+          <a:prstGeom prst="rect">
+            <a:avLst/>
+          </a:prstGeom>
+          <a:noFill/>
+        </p:spPr>
+        <p:txBody>
+          <a:bodyPr wrap="none" rtlCol="0">
+            <a:spAutoFit/>
+          </a:bodyPr>
+          <a:lstStyle/>
+          <a:p>
+            <a:r>
+              <a:rPr lang="es-MX" dirty="0"/>
+              <a:t>Actualizar datos personales</a:t>
+            </a:r>
+          </a:p>
+        </p:txBody>
+      </p:sp>
+      <p:sp>
+        <p:nvSpPr>
+          <p:cNvPr id="7" name="Rectángulo: esquinas redondeadas 6">
+            <a:extLst>
+              <a:ext uri="{FF2B5EF4-FFF2-40B4-BE49-F238E27FC236}">
+                <a16:creationId xmlns:a16="http://schemas.microsoft.com/office/drawing/2014/main" id="{671DC5BA-0D68-40C5-8220-EFDE1D98F49D}"/>
+              </a:ext>
+            </a:extLst>
+          </p:cNvPr>
+          <p:cNvSpPr/>
+          <p:nvPr/>
+        </p:nvSpPr>
+        <p:spPr>
+          <a:xfrm>
+            <a:off x="4739312" y="1820621"/>
+            <a:ext cx="1608667" cy="369332"/>
+          </a:xfrm>
+          <a:prstGeom prst="roundRect">
+            <a:avLst/>
+          </a:prstGeom>
+        </p:spPr>
+        <p:style>
+          <a:lnRef idx="2">
+            <a:schemeClr val="dk1"/>
+          </a:lnRef>
+          <a:fillRef idx="1">
+            <a:schemeClr val="lt1"/>
+          </a:fillRef>
+          <a:effectRef idx="0">
+            <a:schemeClr val="dk1"/>
+          </a:effectRef>
+          <a:fontRef idx="minor">
+            <a:schemeClr val="dk1"/>
+          </a:fontRef>
+        </p:style>
+        <p:txBody>
+          <a:bodyPr rtlCol="0" anchor="ctr"/>
+          <a:lstStyle/>
+          <a:p>
+            <a:pPr algn="ctr"/>
+            <a:r>
+              <a:rPr lang="es-MX" dirty="0"/>
+              <a:t>Paterno</a:t>
+            </a:r>
+          </a:p>
+        </p:txBody>
+      </p:sp>
+      <p:sp>
+        <p:nvSpPr>
+          <p:cNvPr id="8" name="Rectángulo: esquinas redondeadas 7">
+            <a:extLst>
+              <a:ext uri="{FF2B5EF4-FFF2-40B4-BE49-F238E27FC236}">
+                <a16:creationId xmlns:a16="http://schemas.microsoft.com/office/drawing/2014/main" id="{D1E27EF9-4C8F-423A-B7BF-36CCE50230EF}"/>
+              </a:ext>
+            </a:extLst>
+          </p:cNvPr>
+          <p:cNvSpPr/>
+          <p:nvPr/>
+        </p:nvSpPr>
+        <p:spPr>
+          <a:xfrm>
+            <a:off x="6697132" y="1820621"/>
+            <a:ext cx="1608667" cy="369332"/>
+          </a:xfrm>
+          <a:prstGeom prst="roundRect">
+            <a:avLst/>
+          </a:prstGeom>
+        </p:spPr>
+        <p:style>
+          <a:lnRef idx="2">
+            <a:schemeClr val="dk1"/>
+          </a:lnRef>
+          <a:fillRef idx="1">
+            <a:schemeClr val="lt1"/>
+          </a:fillRef>
+          <a:effectRef idx="0">
+            <a:schemeClr val="dk1"/>
+          </a:effectRef>
+          <a:fontRef idx="minor">
+            <a:schemeClr val="dk1"/>
+          </a:fontRef>
+        </p:style>
+        <p:txBody>
+          <a:bodyPr rtlCol="0" anchor="ctr"/>
+          <a:lstStyle/>
+          <a:p>
+            <a:pPr algn="ctr"/>
+            <a:r>
+              <a:rPr lang="es-MX" dirty="0"/>
+              <a:t>Materno</a:t>
+            </a:r>
+          </a:p>
+        </p:txBody>
+      </p:sp>
+      <p:sp>
+        <p:nvSpPr>
+          <p:cNvPr id="9" name="Rectángulo: esquinas redondeadas 8">
+            <a:extLst>
+              <a:ext uri="{FF2B5EF4-FFF2-40B4-BE49-F238E27FC236}">
+                <a16:creationId xmlns:a16="http://schemas.microsoft.com/office/drawing/2014/main" id="{B5D5D277-22A4-4320-BF00-13B6436FCF86}"/>
+              </a:ext>
+            </a:extLst>
+          </p:cNvPr>
+          <p:cNvSpPr/>
+          <p:nvPr/>
+        </p:nvSpPr>
+        <p:spPr>
+          <a:xfrm>
+            <a:off x="8602132" y="1821371"/>
+            <a:ext cx="1608667" cy="369332"/>
+          </a:xfrm>
+          <a:prstGeom prst="roundRect">
+            <a:avLst/>
+          </a:prstGeom>
+        </p:spPr>
+        <p:style>
+          <a:lnRef idx="2">
+            <a:schemeClr val="dk1"/>
+          </a:lnRef>
+          <a:fillRef idx="1">
+            <a:schemeClr val="lt1"/>
+          </a:fillRef>
+          <a:effectRef idx="0">
+            <a:schemeClr val="dk1"/>
+          </a:effectRef>
+          <a:fontRef idx="minor">
+            <a:schemeClr val="dk1"/>
+          </a:fontRef>
+        </p:style>
+        <p:txBody>
+          <a:bodyPr rtlCol="0" anchor="ctr"/>
+          <a:lstStyle/>
+          <a:p>
+            <a:pPr algn="ctr"/>
+            <a:r>
+              <a:rPr lang="es-MX" dirty="0"/>
+              <a:t>Nombre</a:t>
+            </a:r>
+          </a:p>
+        </p:txBody>
+      </p:sp>
+      <p:sp>
+        <p:nvSpPr>
+          <p:cNvPr id="10" name="Rectángulo redondeado 8">
+            <a:extLst>
+              <a:ext uri="{FF2B5EF4-FFF2-40B4-BE49-F238E27FC236}">
+                <a16:creationId xmlns:a16="http://schemas.microsoft.com/office/drawing/2014/main" id="{AB1520A7-8046-4DE7-90B6-253D77A2FDC1}"/>
+              </a:ext>
+            </a:extLst>
+          </p:cNvPr>
+          <p:cNvSpPr/>
+          <p:nvPr/>
+        </p:nvSpPr>
+        <p:spPr>
+          <a:xfrm>
+            <a:off x="4792134" y="2353735"/>
+            <a:ext cx="1608666" cy="389466"/>
+          </a:xfrm>
+          <a:prstGeom prst="roundRect">
+            <a:avLst/>
+          </a:prstGeom>
+        </p:spPr>
+        <p:style>
+          <a:lnRef idx="2">
+            <a:schemeClr val="dk1"/>
+          </a:lnRef>
+          <a:fillRef idx="1">
+            <a:schemeClr val="lt1"/>
+          </a:fillRef>
+          <a:effectRef idx="0">
+            <a:schemeClr val="dk1"/>
+          </a:effectRef>
+          <a:fontRef idx="minor">
+            <a:schemeClr val="dk1"/>
+          </a:fontRef>
+        </p:style>
+        <p:txBody>
+          <a:bodyPr rtlCol="0" anchor="ctr"/>
+          <a:lstStyle/>
+          <a:p>
+            <a:pPr algn="ctr"/>
+            <a:r>
+              <a:rPr lang="es-MX" dirty="0"/>
+              <a:t>Fecha </a:t>
+            </a:r>
+            <a:r>
+              <a:rPr lang="es-MX" dirty="0" err="1"/>
+              <a:t>Nac</a:t>
+            </a:r>
+            <a:endParaRPr lang="es-MX" dirty="0"/>
+          </a:p>
+        </p:txBody>
+      </p:sp>
+      <p:sp>
+        <p:nvSpPr>
+          <p:cNvPr id="11" name="Rectángulo redondeado 9">
+            <a:extLst>
+              <a:ext uri="{FF2B5EF4-FFF2-40B4-BE49-F238E27FC236}">
+                <a16:creationId xmlns:a16="http://schemas.microsoft.com/office/drawing/2014/main" id="{94F6A713-C6DF-4437-BBED-998F3EF93706}"/>
+              </a:ext>
+            </a:extLst>
+          </p:cNvPr>
+          <p:cNvSpPr/>
+          <p:nvPr/>
+        </p:nvSpPr>
+        <p:spPr>
+          <a:xfrm>
+            <a:off x="6697133" y="2353735"/>
+            <a:ext cx="1608666" cy="389466"/>
+          </a:xfrm>
+          <a:prstGeom prst="roundRect">
+            <a:avLst/>
+          </a:prstGeom>
+        </p:spPr>
+        <p:style>
+          <a:lnRef idx="2">
+            <a:schemeClr val="dk1"/>
+          </a:lnRef>
+          <a:fillRef idx="1">
+            <a:schemeClr val="lt1"/>
+          </a:fillRef>
+          <a:effectRef idx="0">
+            <a:schemeClr val="dk1"/>
+          </a:effectRef>
+          <a:fontRef idx="minor">
+            <a:schemeClr val="dk1"/>
+          </a:fontRef>
+        </p:style>
+        <p:txBody>
+          <a:bodyPr rtlCol="0" anchor="ctr"/>
+          <a:lstStyle/>
+          <a:p>
+            <a:pPr algn="ctr"/>
+            <a:r>
+              <a:rPr lang="es-MX" dirty="0"/>
+              <a:t>Sexo</a:t>
+            </a:r>
+          </a:p>
+        </p:txBody>
+      </p:sp>
+      <p:sp>
+        <p:nvSpPr>
+          <p:cNvPr id="12" name="Rectángulo redondeado 10">
+            <a:extLst>
+              <a:ext uri="{FF2B5EF4-FFF2-40B4-BE49-F238E27FC236}">
+                <a16:creationId xmlns:a16="http://schemas.microsoft.com/office/drawing/2014/main" id="{EA0E4AC2-D9E6-4DA4-8F8E-66603393A804}"/>
+              </a:ext>
+            </a:extLst>
+          </p:cNvPr>
+          <p:cNvSpPr/>
+          <p:nvPr/>
+        </p:nvSpPr>
+        <p:spPr>
+          <a:xfrm>
+            <a:off x="8602132" y="2353735"/>
+            <a:ext cx="1608666" cy="389466"/>
+          </a:xfrm>
+          <a:prstGeom prst="roundRect">
+            <a:avLst/>
+          </a:prstGeom>
+        </p:spPr>
+        <p:style>
+          <a:lnRef idx="2">
+            <a:schemeClr val="dk1"/>
+          </a:lnRef>
+          <a:fillRef idx="1">
+            <a:schemeClr val="lt1"/>
+          </a:fillRef>
+          <a:effectRef idx="0">
+            <a:schemeClr val="dk1"/>
+          </a:effectRef>
+          <a:fontRef idx="minor">
+            <a:schemeClr val="dk1"/>
+          </a:fontRef>
+        </p:style>
+        <p:txBody>
+          <a:bodyPr rtlCol="0" anchor="ctr"/>
+          <a:lstStyle/>
+          <a:p>
+            <a:pPr algn="ctr"/>
+            <a:r>
+              <a:rPr lang="es-MX" dirty="0"/>
+              <a:t>Teléfono</a:t>
+            </a:r>
+          </a:p>
+        </p:txBody>
+      </p:sp>
+      <p:sp>
+        <p:nvSpPr>
+          <p:cNvPr id="13" name="Rectángulo redondeado 11">
+            <a:extLst>
+              <a:ext uri="{FF2B5EF4-FFF2-40B4-BE49-F238E27FC236}">
+                <a16:creationId xmlns:a16="http://schemas.microsoft.com/office/drawing/2014/main" id="{E3AE7996-E007-47C6-AAD8-B76AABCE955F}"/>
+              </a:ext>
+            </a:extLst>
+          </p:cNvPr>
+          <p:cNvSpPr/>
+          <p:nvPr/>
+        </p:nvSpPr>
+        <p:spPr>
+          <a:xfrm>
+            <a:off x="4792134" y="2904069"/>
+            <a:ext cx="1608666" cy="389466"/>
+          </a:xfrm>
+          <a:prstGeom prst="roundRect">
+            <a:avLst/>
+          </a:prstGeom>
+        </p:spPr>
+        <p:style>
+          <a:lnRef idx="2">
+            <a:schemeClr val="dk1"/>
+          </a:lnRef>
+          <a:fillRef idx="1">
+            <a:schemeClr val="lt1"/>
+          </a:fillRef>
+          <a:effectRef idx="0">
+            <a:schemeClr val="dk1"/>
+          </a:effectRef>
+          <a:fontRef idx="minor">
+            <a:schemeClr val="dk1"/>
+          </a:fontRef>
+        </p:style>
+        <p:txBody>
+          <a:bodyPr rtlCol="0" anchor="ctr"/>
+          <a:lstStyle/>
+          <a:p>
+            <a:pPr algn="ctr"/>
+            <a:r>
+              <a:rPr lang="es-MX" dirty="0"/>
+              <a:t>Correo</a:t>
+            </a:r>
+          </a:p>
+        </p:txBody>
+      </p:sp>
+      <p:sp>
+        <p:nvSpPr>
+          <p:cNvPr id="15" name="Rectángulo redondeado 13">
+            <a:extLst>
+              <a:ext uri="{FF2B5EF4-FFF2-40B4-BE49-F238E27FC236}">
+                <a16:creationId xmlns:a16="http://schemas.microsoft.com/office/drawing/2014/main" id="{65B18CE1-4901-414D-8E69-21A1326C9018}"/>
+              </a:ext>
+            </a:extLst>
+          </p:cNvPr>
+          <p:cNvSpPr/>
+          <p:nvPr/>
+        </p:nvSpPr>
+        <p:spPr>
+          <a:xfrm>
+            <a:off x="6697133" y="2912474"/>
+            <a:ext cx="1608666" cy="389466"/>
+          </a:xfrm>
+          <a:prstGeom prst="roundRect">
+            <a:avLst/>
+          </a:prstGeom>
+        </p:spPr>
+        <p:style>
+          <a:lnRef idx="2">
+            <a:schemeClr val="dk1"/>
+          </a:lnRef>
+          <a:fillRef idx="1">
+            <a:schemeClr val="lt1"/>
+          </a:fillRef>
+          <a:effectRef idx="0">
+            <a:schemeClr val="dk1"/>
+          </a:effectRef>
+          <a:fontRef idx="minor">
+            <a:schemeClr val="dk1"/>
+          </a:fontRef>
+        </p:style>
+        <p:txBody>
+          <a:bodyPr rtlCol="0" anchor="ctr"/>
+          <a:lstStyle/>
+          <a:p>
+            <a:pPr algn="ctr"/>
+            <a:r>
+              <a:rPr lang="es-MX" dirty="0" err="1"/>
+              <a:t>Password</a:t>
+            </a:r>
+            <a:endParaRPr lang="es-MX" dirty="0"/>
+          </a:p>
+        </p:txBody>
+      </p:sp>
+      <p:sp>
+        <p:nvSpPr>
+          <p:cNvPr id="16" name="Rectángulo redondeado 14">
+            <a:extLst>
+              <a:ext uri="{FF2B5EF4-FFF2-40B4-BE49-F238E27FC236}">
+                <a16:creationId xmlns:a16="http://schemas.microsoft.com/office/drawing/2014/main" id="{930B3AFA-FF08-49D7-80C4-BA11377B78EE}"/>
+              </a:ext>
+            </a:extLst>
+          </p:cNvPr>
+          <p:cNvSpPr/>
+          <p:nvPr/>
+        </p:nvSpPr>
+        <p:spPr>
+          <a:xfrm>
+            <a:off x="4792134" y="3465722"/>
+            <a:ext cx="5418664" cy="563033"/>
+          </a:xfrm>
+          <a:prstGeom prst="roundRect">
+            <a:avLst/>
+          </a:prstGeom>
+        </p:spPr>
+        <p:style>
+          <a:lnRef idx="2">
+            <a:schemeClr val="dk1"/>
+          </a:lnRef>
+          <a:fillRef idx="1">
+            <a:schemeClr val="lt1"/>
+          </a:fillRef>
+          <a:effectRef idx="0">
+            <a:schemeClr val="dk1"/>
+          </a:effectRef>
+          <a:fontRef idx="minor">
+            <a:schemeClr val="dk1"/>
+          </a:fontRef>
+        </p:style>
+        <p:txBody>
+          <a:bodyPr rtlCol="0" anchor="ctr"/>
+          <a:lstStyle/>
+          <a:p>
+            <a:pPr algn="ctr"/>
+            <a:r>
+              <a:rPr lang="es-MX" dirty="0"/>
+              <a:t>Describir ubicación – Oficina, Piso, Cuarto, Dirección </a:t>
+            </a:r>
+            <a:r>
+              <a:rPr lang="es-MX" dirty="0" err="1"/>
+              <a:t>ect</a:t>
+            </a:r>
+            <a:r>
+              <a:rPr lang="es-MX" dirty="0"/>
+              <a:t> …</a:t>
+            </a:r>
+          </a:p>
+        </p:txBody>
+      </p:sp>
+      <p:sp>
+        <p:nvSpPr>
+          <p:cNvPr id="17" name="Rectángulo: esquinas redondeadas 16">
+            <a:extLst>
+              <a:ext uri="{FF2B5EF4-FFF2-40B4-BE49-F238E27FC236}">
+                <a16:creationId xmlns:a16="http://schemas.microsoft.com/office/drawing/2014/main" id="{A79C0E07-A421-4FD8-A408-A8613652A1C8}"/>
+              </a:ext>
+            </a:extLst>
+          </p:cNvPr>
+          <p:cNvSpPr/>
+          <p:nvPr/>
+        </p:nvSpPr>
+        <p:spPr>
+          <a:xfrm>
+            <a:off x="4792134" y="4253217"/>
+            <a:ext cx="5418664" cy="377505"/>
+          </a:xfrm>
+          <a:prstGeom prst="roundRect">
+            <a:avLst/>
+          </a:prstGeom>
+        </p:spPr>
+        <p:style>
+          <a:lnRef idx="2">
+            <a:schemeClr val="dk1"/>
+          </a:lnRef>
+          <a:fillRef idx="1">
+            <a:schemeClr val="lt1"/>
+          </a:fillRef>
+          <a:effectRef idx="0">
+            <a:schemeClr val="dk1"/>
+          </a:effectRef>
+          <a:fontRef idx="minor">
+            <a:schemeClr val="dk1"/>
+          </a:fontRef>
+        </p:style>
+        <p:txBody>
+          <a:bodyPr rtlCol="0" anchor="ctr"/>
+          <a:lstStyle/>
+          <a:p>
+            <a:r>
+              <a:rPr lang="es-MX" dirty="0"/>
+              <a:t>Adjuntar imagen</a:t>
+            </a:r>
+          </a:p>
+        </p:txBody>
+      </p:sp>
+      <p:sp>
+        <p:nvSpPr>
+          <p:cNvPr id="18" name="Rectángulo: esquinas redondeadas 17">
+            <a:extLst>
+              <a:ext uri="{FF2B5EF4-FFF2-40B4-BE49-F238E27FC236}">
+                <a16:creationId xmlns:a16="http://schemas.microsoft.com/office/drawing/2014/main" id="{0ACE0CF9-1BB8-4ADF-B385-077121ABFB87}"/>
+              </a:ext>
+            </a:extLst>
+          </p:cNvPr>
+          <p:cNvSpPr/>
+          <p:nvPr/>
+        </p:nvSpPr>
+        <p:spPr>
+          <a:xfrm>
+            <a:off x="4890782" y="4915949"/>
+            <a:ext cx="2130803" cy="387825"/>
+          </a:xfrm>
+          <a:prstGeom prst="roundRect">
+            <a:avLst/>
+          </a:prstGeom>
+        </p:spPr>
+        <p:style>
+          <a:lnRef idx="2">
+            <a:schemeClr val="accent1">
+              <a:shade val="50000"/>
+            </a:schemeClr>
+          </a:lnRef>
+          <a:fillRef idx="1">
+            <a:schemeClr val="accent1"/>
+          </a:fillRef>
+          <a:effectRef idx="0">
+            <a:schemeClr val="accent1"/>
+          </a:effectRef>
+          <a:fontRef idx="minor">
+            <a:schemeClr val="lt1"/>
+          </a:fontRef>
+        </p:style>
+        <p:txBody>
+          <a:bodyPr rtlCol="0" anchor="ctr"/>
+          <a:lstStyle/>
+          <a:p>
+            <a:pPr algn="ctr"/>
+            <a:r>
+              <a:rPr lang="es-MX" dirty="0"/>
+              <a:t>Actualizar</a:t>
+            </a:r>
+          </a:p>
+        </p:txBody>
+      </p:sp>
+      <p:sp>
+        <p:nvSpPr>
+          <p:cNvPr id="19" name="CuadroTexto 18">
+            <a:extLst>
+              <a:ext uri="{FF2B5EF4-FFF2-40B4-BE49-F238E27FC236}">
+                <a16:creationId xmlns:a16="http://schemas.microsoft.com/office/drawing/2014/main" id="{FF772131-2EC1-4D51-9618-EFB6B129B5A5}"/>
+              </a:ext>
+            </a:extLst>
+          </p:cNvPr>
+          <p:cNvSpPr txBox="1"/>
+          <p:nvPr/>
+        </p:nvSpPr>
+        <p:spPr>
+          <a:xfrm>
+            <a:off x="3640510" y="5698720"/>
+            <a:ext cx="7676240" cy="1077218"/>
+          </a:xfrm>
+          <a:prstGeom prst="rect">
+            <a:avLst/>
+          </a:prstGeom>
+        </p:spPr>
+        <p:style>
+          <a:lnRef idx="2">
+            <a:schemeClr val="accent1"/>
+          </a:lnRef>
+          <a:fillRef idx="1">
+            <a:schemeClr val="lt1"/>
+          </a:fillRef>
+          <a:effectRef idx="0">
+            <a:schemeClr val="accent1"/>
+          </a:effectRef>
+          <a:fontRef idx="minor">
+            <a:schemeClr val="dk1"/>
+          </a:fontRef>
+        </p:style>
+        <p:txBody>
+          <a:bodyPr wrap="square" rtlCol="0">
+            <a:spAutoFit/>
+          </a:bodyPr>
+          <a:lstStyle/>
+          <a:p>
+            <a:r>
+              <a:rPr lang="es-MX" sz="1600" dirty="0"/>
+              <a:t>El usuario podrá actualizar sus datos personales si es necesario </a:t>
+            </a:r>
+          </a:p>
+          <a:p>
+            <a:r>
+              <a:rPr lang="es-MX" sz="1600" dirty="0"/>
+              <a:t>o existe equivocación en algún dato, esto con el fin de tener mejor actualizado el sistema, el usuario no podrá ser cambiado, solo por el </a:t>
+            </a:r>
+            <a:r>
+              <a:rPr lang="es-MX" sz="1600" dirty="0" err="1"/>
+              <a:t>admin</a:t>
+            </a:r>
+            <a:r>
+              <a:rPr lang="es-MX" sz="1600" dirty="0"/>
+              <a:t>, con el fin de que se pueda encontrar fácilmente aunque no tenga el mismo nombre de persona</a:t>
+            </a:r>
+          </a:p>
+        </p:txBody>
+      </p:sp>
+    </p:spTree>
+    <p:extLst>
+      <p:ext uri="{BB962C8B-B14F-4D97-AF65-F5344CB8AC3E}">
+        <p14:creationId xmlns:p14="http://schemas.microsoft.com/office/powerpoint/2010/main" val="3973450264"/>
+      </p:ext>
+    </p:extLst>
+  </p:cSld>
+  <p:clrMapOvr>
+    <a:masterClrMapping/>
+  </p:clrMapOvr>
+</p:sld>
+</file>
+
+<file path=ppt/slides/slide12.xml><?xml version="1.0" encoding="utf-8"?>
+<p:sld xmlns:a="http://schemas.openxmlformats.org/drawingml/2006/main" xmlns:r="http://schemas.openxmlformats.org/officeDocument/2006/relationships" xmlns:p="http://schemas.openxmlformats.org/presentationml/2006/main">
+  <p:cSld>
+    <p:spTree>
+      <p:nvGrpSpPr>
+        <p:cNvPr id="1" name=""/>
+        <p:cNvGrpSpPr/>
+        <p:nvPr/>
+      </p:nvGrpSpPr>
+      <p:grpSpPr>
+        <a:xfrm>
+          <a:off x="0" y="0"/>
+          <a:ext cx="0" cy="0"/>
+          <a:chOff x="0" y="0"/>
+          <a:chExt cx="0" cy="0"/>
+        </a:xfrm>
+      </p:grpSpPr>
+      <p:sp>
+        <p:nvSpPr>
+          <p:cNvPr id="2" name="Título 1">
+            <a:extLst>
+              <a:ext uri="{FF2B5EF4-FFF2-40B4-BE49-F238E27FC236}">
+                <a16:creationId xmlns:a16="http://schemas.microsoft.com/office/drawing/2014/main" id="{01E24106-4C20-457F-A57D-72DDF2D78A08}"/>
+              </a:ext>
+            </a:extLst>
+          </p:cNvPr>
+          <p:cNvSpPr>
+            <a:spLocks noGrp="1"/>
+          </p:cNvSpPr>
+          <p:nvPr>
+            <p:ph type="title"/>
+          </p:nvPr>
+        </p:nvSpPr>
+        <p:spPr/>
+        <p:txBody>
+          <a:bodyPr/>
+          <a:lstStyle/>
+          <a:p>
+            <a:r>
+              <a:rPr lang="es-MX" dirty="0"/>
+              <a:t>Cliente</a:t>
+            </a:r>
+            <a:br>
+              <a:rPr lang="es-MX" dirty="0"/>
+            </a:br>
+            <a:r>
+              <a:rPr lang="es-MX" dirty="0"/>
+              <a:t>- Vista de los dispositivos </a:t>
+            </a:r>
+          </a:p>
+        </p:txBody>
+      </p:sp>
+      <p:sp>
+        <p:nvSpPr>
+          <p:cNvPr id="3" name="Marcador de contenido 2">
+            <a:extLst>
+              <a:ext uri="{FF2B5EF4-FFF2-40B4-BE49-F238E27FC236}">
+                <a16:creationId xmlns:a16="http://schemas.microsoft.com/office/drawing/2014/main" id="{0EF7CAC7-A86A-45E6-8902-10976598A53C}"/>
+              </a:ext>
+            </a:extLst>
+          </p:cNvPr>
+          <p:cNvSpPr>
+            <a:spLocks noGrp="1"/>
+          </p:cNvSpPr>
+          <p:nvPr>
+            <p:ph idx="1"/>
+          </p:nvPr>
+        </p:nvSpPr>
+        <p:spPr/>
+        <p:txBody>
+          <a:bodyPr/>
+          <a:lstStyle/>
+          <a:p>
+            <a:r>
+              <a:rPr lang="es-MX" dirty="0"/>
+              <a:t>Simplemente se mostrara una lista con los detalles de los dispositivos asignados (PC, LAPTOP </a:t>
+            </a:r>
+            <a:r>
+              <a:rPr lang="es-MX" dirty="0" err="1"/>
+              <a:t>etc</a:t>
+            </a:r>
+            <a:r>
+              <a:rPr lang="es-MX" dirty="0"/>
+              <a:t> …)</a:t>
+            </a:r>
+          </a:p>
+        </p:txBody>
+      </p:sp>
+    </p:spTree>
+    <p:extLst>
+      <p:ext uri="{BB962C8B-B14F-4D97-AF65-F5344CB8AC3E}">
+        <p14:creationId xmlns:p14="http://schemas.microsoft.com/office/powerpoint/2010/main" val="3833791843"/>
+      </p:ext>
+    </p:extLst>
+  </p:cSld>
+  <p:clrMapOvr>
+    <a:masterClrMapping/>
+  </p:clrMapOvr>
+</p:sld>
+</file>
+
+<file path=ppt/slides/slide13.xml><?xml version="1.0" encoding="utf-8"?>
+<p:sld xmlns:a="http://schemas.openxmlformats.org/drawingml/2006/main" xmlns:r="http://schemas.openxmlformats.org/officeDocument/2006/relationships" xmlns:p="http://schemas.openxmlformats.org/presentationml/2006/main">
+  <p:cSld>
+    <p:spTree>
+      <p:nvGrpSpPr>
+        <p:cNvPr id="1" name=""/>
+        <p:cNvGrpSpPr/>
+        <p:nvPr/>
+      </p:nvGrpSpPr>
+      <p:grpSpPr>
+        <a:xfrm>
+          <a:off x="0" y="0"/>
+          <a:ext cx="0" cy="0"/>
+          <a:chOff x="0" y="0"/>
+          <a:chExt cx="0" cy="0"/>
+        </a:xfrm>
+      </p:grpSpPr>
+      <p:sp>
+        <p:nvSpPr>
+          <p:cNvPr id="2" name="Título 1">
+            <a:extLst>
+              <a:ext uri="{FF2B5EF4-FFF2-40B4-BE49-F238E27FC236}">
+                <a16:creationId xmlns:a16="http://schemas.microsoft.com/office/drawing/2014/main" id="{492A68D9-C224-467B-B066-6BA1A0E6D9FA}"/>
+              </a:ext>
+            </a:extLst>
+          </p:cNvPr>
+          <p:cNvSpPr>
+            <a:spLocks noGrp="1"/>
+          </p:cNvSpPr>
+          <p:nvPr>
+            <p:ph type="title"/>
+          </p:nvPr>
+        </p:nvSpPr>
+        <p:spPr/>
+        <p:txBody>
+          <a:bodyPr/>
+          <a:lstStyle/>
+          <a:p>
+            <a:r>
+              <a:rPr lang="es-MX" dirty="0"/>
+              <a:t>Cliente </a:t>
+            </a:r>
+            <a:br>
+              <a:rPr lang="es-MX" dirty="0"/>
+            </a:br>
+            <a:r>
+              <a:rPr lang="es-MX" dirty="0"/>
+              <a:t>- Levantar reportes</a:t>
+            </a:r>
+          </a:p>
+        </p:txBody>
+      </p:sp>
+      <p:sp>
+        <p:nvSpPr>
+          <p:cNvPr id="4" name="Rectángulo 3">
+            <a:extLst>
+              <a:ext uri="{FF2B5EF4-FFF2-40B4-BE49-F238E27FC236}">
+                <a16:creationId xmlns:a16="http://schemas.microsoft.com/office/drawing/2014/main" id="{9513AE84-9433-42C4-9C4F-234AA6213127}"/>
+              </a:ext>
+            </a:extLst>
+          </p:cNvPr>
+          <p:cNvSpPr/>
+          <p:nvPr/>
+        </p:nvSpPr>
+        <p:spPr>
+          <a:xfrm>
+            <a:off x="3993161" y="1320509"/>
+            <a:ext cx="7130642" cy="4199447"/>
+          </a:xfrm>
+          <a:prstGeom prst="rect">
+            <a:avLst/>
+          </a:prstGeom>
+        </p:spPr>
+        <p:style>
+          <a:lnRef idx="2">
+            <a:schemeClr val="dk1"/>
+          </a:lnRef>
+          <a:fillRef idx="1">
+            <a:schemeClr val="lt1"/>
+          </a:fillRef>
+          <a:effectRef idx="0">
+            <a:schemeClr val="dk1"/>
+          </a:effectRef>
+          <a:fontRef idx="minor">
+            <a:schemeClr val="dk1"/>
+          </a:fontRef>
+        </p:style>
+        <p:txBody>
+          <a:bodyPr rtlCol="0" anchor="ctr"/>
+          <a:lstStyle/>
+          <a:p>
+            <a:pPr algn="ctr"/>
+            <a:endParaRPr lang="es-MX"/>
+          </a:p>
+        </p:txBody>
+      </p:sp>
+      <p:sp>
+        <p:nvSpPr>
+          <p:cNvPr id="5" name="Rectángulo: esquinas redondeadas 4">
+            <a:extLst>
+              <a:ext uri="{FF2B5EF4-FFF2-40B4-BE49-F238E27FC236}">
+                <a16:creationId xmlns:a16="http://schemas.microsoft.com/office/drawing/2014/main" id="{BE370CD7-57FA-4ABE-B7BB-4F4F0B11136D}"/>
+              </a:ext>
+            </a:extLst>
+          </p:cNvPr>
+          <p:cNvSpPr/>
+          <p:nvPr/>
+        </p:nvSpPr>
+        <p:spPr>
+          <a:xfrm>
+            <a:off x="4639113" y="1686187"/>
+            <a:ext cx="6073628" cy="486561"/>
+          </a:xfrm>
+          <a:prstGeom prst="roundRect">
+            <a:avLst/>
+          </a:prstGeom>
+        </p:spPr>
+        <p:style>
+          <a:lnRef idx="2">
+            <a:schemeClr val="dk1"/>
+          </a:lnRef>
+          <a:fillRef idx="1">
+            <a:schemeClr val="lt1"/>
+          </a:fillRef>
+          <a:effectRef idx="0">
+            <a:schemeClr val="dk1"/>
+          </a:effectRef>
+          <a:fontRef idx="minor">
+            <a:schemeClr val="dk1"/>
+          </a:fontRef>
+        </p:style>
+        <p:txBody>
+          <a:bodyPr rtlCol="0" anchor="ctr"/>
+          <a:lstStyle/>
+          <a:p>
+            <a:pPr algn="ctr"/>
+            <a:r>
+              <a:rPr lang="es-MX" dirty="0"/>
+              <a:t>Seleccionar dispositivo / otro </a:t>
+            </a:r>
+          </a:p>
+        </p:txBody>
+      </p:sp>
+      <p:sp>
+        <p:nvSpPr>
+          <p:cNvPr id="6" name="Rectángulo: esquinas redondeadas 5">
+            <a:extLst>
+              <a:ext uri="{FF2B5EF4-FFF2-40B4-BE49-F238E27FC236}">
+                <a16:creationId xmlns:a16="http://schemas.microsoft.com/office/drawing/2014/main" id="{DF79FD0F-D610-4AB1-8437-8F65BE2F1FD7}"/>
+              </a:ext>
+            </a:extLst>
+          </p:cNvPr>
+          <p:cNvSpPr/>
+          <p:nvPr/>
+        </p:nvSpPr>
+        <p:spPr>
+          <a:xfrm>
+            <a:off x="4639113" y="2367558"/>
+            <a:ext cx="6073628" cy="1744910"/>
+          </a:xfrm>
+          <a:prstGeom prst="roundRect">
+            <a:avLst/>
+          </a:prstGeom>
+        </p:spPr>
+        <p:style>
+          <a:lnRef idx="2">
+            <a:schemeClr val="dk1"/>
+          </a:lnRef>
+          <a:fillRef idx="1">
+            <a:schemeClr val="lt1"/>
+          </a:fillRef>
+          <a:effectRef idx="0">
+            <a:schemeClr val="dk1"/>
+          </a:effectRef>
+          <a:fontRef idx="minor">
+            <a:schemeClr val="dk1"/>
+          </a:fontRef>
+        </p:style>
+        <p:txBody>
+          <a:bodyPr rtlCol="0" anchor="ctr"/>
+          <a:lstStyle/>
+          <a:p>
+            <a:pPr algn="ctr"/>
+            <a:r>
+              <a:rPr lang="es-MX" dirty="0"/>
+              <a:t>Describir el problema que tienes, petición o sugerencia si seleccionaste otro</a:t>
+            </a:r>
+          </a:p>
+        </p:txBody>
+      </p:sp>
+      <p:sp>
+        <p:nvSpPr>
+          <p:cNvPr id="7" name="Rectángulo: esquinas redondeadas 6">
+            <a:extLst>
+              <a:ext uri="{FF2B5EF4-FFF2-40B4-BE49-F238E27FC236}">
+                <a16:creationId xmlns:a16="http://schemas.microsoft.com/office/drawing/2014/main" id="{52B6395A-9C62-434D-ADBC-C1507E0D1FD4}"/>
+              </a:ext>
+            </a:extLst>
+          </p:cNvPr>
+          <p:cNvSpPr/>
+          <p:nvPr/>
+        </p:nvSpPr>
+        <p:spPr>
+          <a:xfrm>
+            <a:off x="4639112" y="4379053"/>
+            <a:ext cx="1610685" cy="497745"/>
+          </a:xfrm>
+          <a:prstGeom prst="roundRect">
+            <a:avLst/>
+          </a:prstGeom>
+        </p:spPr>
+        <p:style>
+          <a:lnRef idx="2">
+            <a:schemeClr val="accent1">
+              <a:shade val="50000"/>
+            </a:schemeClr>
+          </a:lnRef>
+          <a:fillRef idx="1">
+            <a:schemeClr val="accent1"/>
+          </a:fillRef>
+          <a:effectRef idx="0">
+            <a:schemeClr val="accent1"/>
+          </a:effectRef>
+          <a:fontRef idx="minor">
+            <a:schemeClr val="lt1"/>
+          </a:fontRef>
+        </p:style>
+        <p:txBody>
+          <a:bodyPr rtlCol="0" anchor="ctr"/>
+          <a:lstStyle/>
+          <a:p>
+            <a:pPr algn="ctr"/>
+            <a:r>
+              <a:rPr lang="es-MX" dirty="0"/>
+              <a:t>Agregar</a:t>
+            </a:r>
+          </a:p>
+        </p:txBody>
+      </p:sp>
+      <p:sp>
+        <p:nvSpPr>
+          <p:cNvPr id="8" name="CuadroTexto 7">
+            <a:extLst>
+              <a:ext uri="{FF2B5EF4-FFF2-40B4-BE49-F238E27FC236}">
+                <a16:creationId xmlns:a16="http://schemas.microsoft.com/office/drawing/2014/main" id="{C761DAFE-858F-4C44-A84B-6A5A9B8939CE}"/>
+              </a:ext>
+            </a:extLst>
+          </p:cNvPr>
+          <p:cNvSpPr txBox="1"/>
+          <p:nvPr/>
+        </p:nvSpPr>
+        <p:spPr>
+          <a:xfrm>
+            <a:off x="4529223" y="805811"/>
+            <a:ext cx="6058518" cy="369332"/>
+          </a:xfrm>
+          <a:prstGeom prst="rect">
+            <a:avLst/>
+          </a:prstGeom>
+          <a:noFill/>
+        </p:spPr>
+        <p:txBody>
+          <a:bodyPr wrap="none" rtlCol="0">
+            <a:spAutoFit/>
+          </a:bodyPr>
+          <a:lstStyle/>
+          <a:p>
+            <a:r>
+              <a:rPr lang="es-MX" dirty="0"/>
+              <a:t>Agregar nuevo reporte o problema con mi equipo de computo</a:t>
+            </a:r>
+          </a:p>
+        </p:txBody>
+      </p:sp>
+    </p:spTree>
+    <p:extLst>
+      <p:ext uri="{BB962C8B-B14F-4D97-AF65-F5344CB8AC3E}">
+        <p14:creationId xmlns:p14="http://schemas.microsoft.com/office/powerpoint/2010/main" val="2193355470"/>
+      </p:ext>
+    </p:extLst>
+  </p:cSld>
+  <p:clrMapOvr>
+    <a:masterClrMapping/>
+  </p:clrMapOvr>
+</p:sld>
+</file>
+
+<file path=ppt/slides/slide14.xml><?xml version="1.0" encoding="utf-8"?>
+<p:sld xmlns:a="http://schemas.openxmlformats.org/drawingml/2006/main" xmlns:r="http://schemas.openxmlformats.org/officeDocument/2006/relationships" xmlns:p="http://schemas.openxmlformats.org/presentationml/2006/main">
+  <p:cSld>
+    <p:spTree>
+      <p:nvGrpSpPr>
+        <p:cNvPr id="1" name=""/>
+        <p:cNvGrpSpPr/>
+        <p:nvPr/>
+      </p:nvGrpSpPr>
+      <p:grpSpPr>
+        <a:xfrm>
+          <a:off x="0" y="0"/>
+          <a:ext cx="0" cy="0"/>
+          <a:chOff x="0" y="0"/>
+          <a:chExt cx="0" cy="0"/>
+        </a:xfrm>
+      </p:grpSpPr>
+      <p:sp>
+        <p:nvSpPr>
+          <p:cNvPr id="2" name="Título 1">
+            <a:extLst>
+              <a:ext uri="{FF2B5EF4-FFF2-40B4-BE49-F238E27FC236}">
+                <a16:creationId xmlns:a16="http://schemas.microsoft.com/office/drawing/2014/main" id="{8388226A-B761-42DD-84C0-792CCE03DD81}"/>
+              </a:ext>
+            </a:extLst>
+          </p:cNvPr>
+          <p:cNvSpPr>
+            <a:spLocks noGrp="1"/>
+          </p:cNvSpPr>
+          <p:nvPr>
+            <p:ph type="title"/>
+          </p:nvPr>
+        </p:nvSpPr>
+        <p:spPr/>
+        <p:txBody>
+          <a:bodyPr/>
+          <a:lstStyle/>
+          <a:p>
+            <a:r>
+              <a:rPr lang="es-MX" dirty="0"/>
+              <a:t>Cliente </a:t>
+            </a:r>
+            <a:br>
+              <a:rPr lang="es-MX" dirty="0"/>
+            </a:br>
+            <a:r>
+              <a:rPr lang="es-MX" dirty="0"/>
+              <a:t>- Levantar reportes</a:t>
+            </a:r>
+          </a:p>
+        </p:txBody>
+      </p:sp>
+      <p:graphicFrame>
+        <p:nvGraphicFramePr>
+          <p:cNvPr id="4" name="Tabla 4">
+            <a:extLst>
+              <a:ext uri="{FF2B5EF4-FFF2-40B4-BE49-F238E27FC236}">
+                <a16:creationId xmlns:a16="http://schemas.microsoft.com/office/drawing/2014/main" id="{23CC96C8-7846-45AE-98D9-7A9974E32843}"/>
+              </a:ext>
+            </a:extLst>
+          </p:cNvPr>
+          <p:cNvGraphicFramePr>
+            <a:graphicFrameLocks noGrp="1"/>
+          </p:cNvGraphicFramePr>
+          <p:nvPr>
+            <p:extLst>
+              <p:ext uri="{D42A27DB-BD31-4B8C-83A1-F6EECF244321}">
+                <p14:modId xmlns:p14="http://schemas.microsoft.com/office/powerpoint/2010/main" val="2391317954"/>
+              </p:ext>
+            </p:extLst>
+          </p:nvPr>
+        </p:nvGraphicFramePr>
+        <p:xfrm>
+          <a:off x="3583963" y="1709567"/>
+          <a:ext cx="8128001" cy="1280160"/>
+        </p:xfrm>
+        <a:graphic>
+          <a:graphicData uri="http://schemas.openxmlformats.org/drawingml/2006/table">
+            <a:tbl>
+              <a:tblPr firstRow="1" bandRow="1">
+                <a:tableStyleId>{5C22544A-7EE6-4342-B048-85BDC9FD1C3A}</a:tableStyleId>
+              </a:tblPr>
+              <a:tblGrid>
+                <a:gridCol w="1161143">
+                  <a:extLst>
+                    <a:ext uri="{9D8B030D-6E8A-4147-A177-3AD203B41FA5}">
+                      <a16:colId xmlns:a16="http://schemas.microsoft.com/office/drawing/2014/main" val="3391996640"/>
+                    </a:ext>
+                  </a:extLst>
+                </a:gridCol>
+                <a:gridCol w="1161143">
+                  <a:extLst>
+                    <a:ext uri="{9D8B030D-6E8A-4147-A177-3AD203B41FA5}">
+                      <a16:colId xmlns:a16="http://schemas.microsoft.com/office/drawing/2014/main" val="1582395546"/>
+                    </a:ext>
+                  </a:extLst>
+                </a:gridCol>
+                <a:gridCol w="1161143">
+                  <a:extLst>
+                    <a:ext uri="{9D8B030D-6E8A-4147-A177-3AD203B41FA5}">
+                      <a16:colId xmlns:a16="http://schemas.microsoft.com/office/drawing/2014/main" val="284557211"/>
+                    </a:ext>
+                  </a:extLst>
+                </a:gridCol>
+                <a:gridCol w="1161143">
+                  <a:extLst>
+                    <a:ext uri="{9D8B030D-6E8A-4147-A177-3AD203B41FA5}">
+                      <a16:colId xmlns:a16="http://schemas.microsoft.com/office/drawing/2014/main" val="607702675"/>
+                    </a:ext>
+                  </a:extLst>
+                </a:gridCol>
+                <a:gridCol w="1161143">
+                  <a:extLst>
+                    <a:ext uri="{9D8B030D-6E8A-4147-A177-3AD203B41FA5}">
+                      <a16:colId xmlns:a16="http://schemas.microsoft.com/office/drawing/2014/main" val="129696976"/>
+                    </a:ext>
+                  </a:extLst>
+                </a:gridCol>
+                <a:gridCol w="1161143">
+                  <a:extLst>
+                    <a:ext uri="{9D8B030D-6E8A-4147-A177-3AD203B41FA5}">
+                      <a16:colId xmlns:a16="http://schemas.microsoft.com/office/drawing/2014/main" val="1357484437"/>
+                    </a:ext>
+                  </a:extLst>
+                </a:gridCol>
+                <a:gridCol w="1161143">
+                  <a:extLst>
+                    <a:ext uri="{9D8B030D-6E8A-4147-A177-3AD203B41FA5}">
+                      <a16:colId xmlns:a16="http://schemas.microsoft.com/office/drawing/2014/main" val="615698461"/>
+                    </a:ext>
+                  </a:extLst>
+                </a:gridCol>
+              </a:tblGrid>
+              <a:tr h="370840">
+                <a:tc>
+                  <a:txBody>
+                    <a:bodyPr/>
+                    <a:lstStyle/>
+                    <a:p>
+                      <a:r>
+                        <a:rPr lang="es-MX" dirty="0"/>
+                        <a:t>#</a:t>
+                      </a:r>
+                    </a:p>
+                  </a:txBody>
+                  <a:tcPr/>
+                </a:tc>
+                <a:tc>
+                  <a:txBody>
+                    <a:bodyPr/>
+                    <a:lstStyle/>
+                    <a:p>
+                      <a:r>
+                        <a:rPr lang="es-MX" dirty="0"/>
+                        <a:t>Fecha</a:t>
+                      </a:r>
+                    </a:p>
+                  </a:txBody>
+                  <a:tcPr/>
+                </a:tc>
+                <a:tc>
+                  <a:txBody>
+                    <a:bodyPr/>
+                    <a:lstStyle/>
+                    <a:p>
+                      <a:r>
+                        <a:rPr lang="es-MX" dirty="0"/>
+                        <a:t>Dispositivo</a:t>
+                      </a:r>
+                    </a:p>
+                  </a:txBody>
+                  <a:tcPr/>
+                </a:tc>
+                <a:tc>
+                  <a:txBody>
+                    <a:bodyPr/>
+                    <a:lstStyle/>
+                    <a:p>
+                      <a:r>
+                        <a:rPr lang="es-MX" dirty="0"/>
+                        <a:t>Estado</a:t>
+                      </a:r>
+                    </a:p>
+                  </a:txBody>
+                  <a:tcPr/>
+                </a:tc>
+                <a:tc>
+                  <a:txBody>
+                    <a:bodyPr/>
+                    <a:lstStyle/>
+                    <a:p>
+                      <a:r>
+                        <a:rPr lang="es-MX" dirty="0"/>
+                        <a:t>Solución</a:t>
+                      </a:r>
+                    </a:p>
+                  </a:txBody>
+                  <a:tcPr/>
+                </a:tc>
+                <a:tc>
+                  <a:txBody>
+                    <a:bodyPr/>
+                    <a:lstStyle/>
+                    <a:p>
+                      <a:r>
+                        <a:rPr lang="es-MX" dirty="0"/>
+                        <a:t>Editar</a:t>
+                      </a:r>
+                    </a:p>
+                  </a:txBody>
+                  <a:tcPr/>
+                </a:tc>
+                <a:tc>
+                  <a:txBody>
+                    <a:bodyPr/>
+                    <a:lstStyle/>
+                    <a:p>
+                      <a:r>
+                        <a:rPr lang="es-MX" dirty="0"/>
+                        <a:t>Eliminar</a:t>
+                      </a:r>
+                    </a:p>
+                  </a:txBody>
+                  <a:tcPr/>
+                </a:tc>
+                <a:extLst>
+                  <a:ext uri="{0D108BD9-81ED-4DB2-BD59-A6C34878D82A}">
+                    <a16:rowId xmlns:a16="http://schemas.microsoft.com/office/drawing/2014/main" val="3341755247"/>
+                  </a:ext>
+                </a:extLst>
+              </a:tr>
+              <a:tr h="370840">
+                <a:tc>
+                  <a:txBody>
+                    <a:bodyPr/>
+                    <a:lstStyle/>
+                    <a:p>
+                      <a:endParaRPr lang="es-MX"/>
+                    </a:p>
+                  </a:txBody>
+                  <a:tcPr/>
+                </a:tc>
+                <a:tc>
+                  <a:txBody>
+                    <a:bodyPr/>
+                    <a:lstStyle/>
+                    <a:p>
+                      <a:endParaRPr lang="es-MX"/>
+                    </a:p>
+                  </a:txBody>
+                  <a:tcPr/>
+                </a:tc>
+                <a:tc>
+                  <a:txBody>
+                    <a:bodyPr/>
+                    <a:lstStyle/>
+                    <a:p>
+                      <a:endParaRPr lang="es-MX"/>
+                    </a:p>
+                  </a:txBody>
+                  <a:tcPr/>
+                </a:tc>
+                <a:tc>
+                  <a:txBody>
+                    <a:bodyPr/>
+                    <a:lstStyle/>
+                    <a:p>
+                      <a:r>
+                        <a:rPr lang="es-MX" dirty="0"/>
+                        <a:t>Abierto/cerrado</a:t>
+                      </a:r>
+                    </a:p>
+                  </a:txBody>
+                  <a:tcPr/>
+                </a:tc>
+                <a:tc>
+                  <a:txBody>
+                    <a:bodyPr/>
+                    <a:lstStyle/>
+                    <a:p>
+                      <a:endParaRPr lang="es-MX" dirty="0"/>
+                    </a:p>
+                  </a:txBody>
+                  <a:tcPr/>
+                </a:tc>
+                <a:tc>
+                  <a:txBody>
+                    <a:bodyPr/>
+                    <a:lstStyle/>
+                    <a:p>
+                      <a:endParaRPr lang="es-MX" dirty="0"/>
+                    </a:p>
+                  </a:txBody>
+                  <a:tcPr/>
+                </a:tc>
+                <a:tc>
+                  <a:txBody>
+                    <a:bodyPr/>
+                    <a:lstStyle/>
+                    <a:p>
+                      <a:endParaRPr lang="es-MX" dirty="0"/>
+                    </a:p>
+                  </a:txBody>
+                  <a:tcPr/>
+                </a:tc>
+                <a:extLst>
+                  <a:ext uri="{0D108BD9-81ED-4DB2-BD59-A6C34878D82A}">
+                    <a16:rowId xmlns:a16="http://schemas.microsoft.com/office/drawing/2014/main" val="2730918675"/>
+                  </a:ext>
+                </a:extLst>
+              </a:tr>
+            </a:tbl>
+          </a:graphicData>
+        </a:graphic>
+      </p:graphicFrame>
+      <p:sp>
+        <p:nvSpPr>
+          <p:cNvPr id="5" name="CuadroTexto 4">
+            <a:extLst>
+              <a:ext uri="{FF2B5EF4-FFF2-40B4-BE49-F238E27FC236}">
+                <a16:creationId xmlns:a16="http://schemas.microsoft.com/office/drawing/2014/main" id="{553FAFB4-5E8E-4916-A82D-DBC26FA4A520}"/>
+              </a:ext>
+            </a:extLst>
+          </p:cNvPr>
+          <p:cNvSpPr txBox="1"/>
+          <p:nvPr/>
+        </p:nvSpPr>
+        <p:spPr>
+          <a:xfrm>
+            <a:off x="6210357" y="1140327"/>
+            <a:ext cx="2875211" cy="369332"/>
+          </a:xfrm>
+          <a:prstGeom prst="rect">
+            <a:avLst/>
+          </a:prstGeom>
+          <a:noFill/>
+        </p:spPr>
+        <p:txBody>
+          <a:bodyPr wrap="none" rtlCol="0">
+            <a:spAutoFit/>
+          </a:bodyPr>
+          <a:lstStyle/>
+          <a:p>
+            <a:r>
+              <a:rPr lang="es-MX" dirty="0">
+                <a:ln w="0"/>
+                <a:effectLst>
+                  <a:outerShdw blurRad="38100" dist="19050" dir="2700000" algn="tl" rotWithShape="0">
+                    <a:schemeClr val="dk1">
+                      <a:alpha val="40000"/>
+                    </a:schemeClr>
+                  </a:outerShdw>
+                </a:effectLst>
+              </a:rPr>
+              <a:t>Tabla de gestión de reportes</a:t>
+            </a:r>
+          </a:p>
+        </p:txBody>
+      </p:sp>
+      <p:sp>
+        <p:nvSpPr>
+          <p:cNvPr id="6" name="CuadroTexto 5">
+            <a:extLst>
+              <a:ext uri="{FF2B5EF4-FFF2-40B4-BE49-F238E27FC236}">
+                <a16:creationId xmlns:a16="http://schemas.microsoft.com/office/drawing/2014/main" id="{1552CA65-8D85-4548-BB14-D8FC54DE3DB2}"/>
+              </a:ext>
+            </a:extLst>
+          </p:cNvPr>
+          <p:cNvSpPr txBox="1"/>
+          <p:nvPr/>
+        </p:nvSpPr>
+        <p:spPr>
+          <a:xfrm>
+            <a:off x="3800213" y="3424427"/>
+            <a:ext cx="7810150" cy="1200329"/>
+          </a:xfrm>
+          <a:prstGeom prst="rect">
+            <a:avLst/>
+          </a:prstGeom>
+          <a:noFill/>
+        </p:spPr>
+        <p:txBody>
+          <a:bodyPr wrap="square" rtlCol="0">
+            <a:spAutoFit/>
+          </a:bodyPr>
+          <a:lstStyle/>
+          <a:p>
+            <a:r>
+              <a:rPr lang="es-MX" dirty="0"/>
+              <a:t>Editar y eliminar estarán vigentes mientras este reporte no haya sido atendido por el técnico, una vez que el técnico lo ha atendido ya no se podrá utilizar ninguna de las opciones, esta tabla contara con las opciones necesarias para obtener datos de reportes como son Excel, y PDF</a:t>
+            </a:r>
+          </a:p>
+        </p:txBody>
+      </p:sp>
+    </p:spTree>
+    <p:extLst>
+      <p:ext uri="{BB962C8B-B14F-4D97-AF65-F5344CB8AC3E}">
+        <p14:creationId xmlns:p14="http://schemas.microsoft.com/office/powerpoint/2010/main" val="1629568098"/>
+      </p:ext>
+    </p:extLst>
+  </p:cSld>
+  <p:clrMapOvr>
+    <a:masterClrMapping/>
+  </p:clrMapOvr>
+</p:sld>
+</file>
+
+<file path=ppt/slides/slide15.xml><?xml version="1.0" encoding="utf-8"?>
+<p:sld xmlns:a="http://schemas.openxmlformats.org/drawingml/2006/main" xmlns:r="http://schemas.openxmlformats.org/officeDocument/2006/relationships" xmlns:p="http://schemas.openxmlformats.org/presentationml/2006/main">
+  <p:cSld>
+    <p:spTree>
+      <p:nvGrpSpPr>
+        <p:cNvPr id="1" name=""/>
+        <p:cNvGrpSpPr/>
+        <p:nvPr/>
+      </p:nvGrpSpPr>
+      <p:grpSpPr>
+        <a:xfrm>
+          <a:off x="0" y="0"/>
+          <a:ext cx="0" cy="0"/>
+          <a:chOff x="0" y="0"/>
+          <a:chExt cx="0" cy="0"/>
+        </a:xfrm>
+      </p:grpSpPr>
+      <p:sp>
+        <p:nvSpPr>
           <p:cNvPr id="2" name="Título 1"/>
           <p:cNvSpPr>
             <a:spLocks noGrp="1"/>
@@ -3904,10 +5545,9 @@
           <a:lstStyle/>
           <a:p>
             <a:r>
-              <a:rPr lang="es-MX" dirty="0" smtClean="0"/>
+              <a:rPr lang="es-MX" dirty="0"/>
               <a:t>Recursos</a:t>
             </a:r>
-            <a:endParaRPr lang="es-MX" dirty="0"/>
           </a:p>
         </p:txBody>
       </p:sp>
@@ -3927,11 +5567,11 @@
           <a:lstStyle/>
           <a:p>
             <a:r>
-              <a:rPr lang="es-MX" dirty="0" err="1" smtClean="0"/>
+              <a:rPr lang="es-MX" dirty="0" err="1"/>
               <a:t>Login</a:t>
             </a:r>
             <a:r>
-              <a:rPr lang="es-MX" dirty="0" smtClean="0"/>
+              <a:rPr lang="es-MX" dirty="0"/>
               <a:t> de usuario:</a:t>
             </a:r>
           </a:p>
@@ -3941,23 +5581,17 @@
               <a:rPr lang="es-MX" dirty="0">
                 <a:hlinkClick r:id="rId2"/>
               </a:rPr>
-              <a:t>https://</a:t>
-            </a:r>
-            <a:r>
-              <a:rPr lang="es-MX" dirty="0" smtClean="0">
-                <a:hlinkClick r:id="rId2"/>
-              </a:rPr>
-              <a:t>bootsnipp.com/snippets/X2bG0</a:t>
-            </a:r>
-            <a:endParaRPr lang="es-MX" dirty="0" smtClean="0"/>
-          </a:p>
-          <a:p>
-            <a:r>
-              <a:rPr lang="es-MX" dirty="0" err="1" smtClean="0"/>
+              <a:t>https://bootsnipp.com/snippets/X2bG0</a:t>
+            </a:r>
+            <a:endParaRPr lang="es-MX" dirty="0"/>
+          </a:p>
+          <a:p>
+            <a:r>
+              <a:rPr lang="es-MX" dirty="0" err="1"/>
               <a:t>Menu</a:t>
             </a:r>
             <a:r>
-              <a:rPr lang="es-MX" dirty="0" smtClean="0"/>
+              <a:rPr lang="es-MX" dirty="0"/>
               <a:t> y plantilla</a:t>
             </a:r>
           </a:p>
@@ -3967,15 +5601,9 @@
               <a:rPr lang="es-MX" dirty="0">
                 <a:hlinkClick r:id="rId3"/>
               </a:rPr>
-              <a:t>https://</a:t>
-            </a:r>
-            <a:r>
-              <a:rPr lang="es-MX" dirty="0" smtClean="0">
-                <a:hlinkClick r:id="rId3"/>
-              </a:rPr>
-              <a:t>startbootstrap.com/snippets/full-image-background</a:t>
-            </a:r>
-            <a:endParaRPr lang="es-MX" dirty="0" smtClean="0"/>
+              <a:t>https://startbootstrap.com/snippets/full-image-background</a:t>
+            </a:r>
+            <a:endParaRPr lang="es-MX" dirty="0"/>
           </a:p>
           <a:p>
             <a:pPr marL="502920" lvl="1" indent="0">
@@ -4032,16 +5660,12 @@
           <a:p>
             <a:pPr algn="ctr"/>
             <a:r>
-              <a:rPr lang="es-MX" dirty="0" smtClean="0"/>
+              <a:rPr lang="es-MX" dirty="0"/>
               <a:t>¿Cuál es la necesidad?</a:t>
             </a:r>
             <a:br>
-              <a:rPr lang="es-MX" dirty="0" smtClean="0"/>
+              <a:rPr lang="es-MX" dirty="0"/>
             </a:br>
-            <a:r>
-              <a:rPr lang="es-MX" dirty="0"/>
-              <a:t/>
-            </a:r>
             <a:br>
               <a:rPr lang="es-MX" dirty="0"/>
             </a:br>
@@ -4066,28 +5690,28 @@
           <a:p>
             <a:pPr algn="just"/>
             <a:r>
-              <a:rPr lang="es-MX" dirty="0" smtClean="0"/>
+              <a:rPr lang="es-MX" dirty="0"/>
               <a:t>Este sistema se centra en negocios donde los usuarios requieren de soporte técnico constante como suele ser una oficina u otro negocio donde el uso de la computadora o dispositivos digitales sea cotidiano.</a:t>
             </a:r>
           </a:p>
           <a:p>
             <a:pPr algn="just"/>
             <a:r>
-              <a:rPr lang="es-MX" dirty="0" smtClean="0"/>
+              <a:rPr lang="es-MX" dirty="0"/>
               <a:t>Se requiere crear un sistema que nos ayude a gestionar los reportes de soporte técnico o sistemas, ya que el uso de papel ha ocasionado perdida de reportes y a veces olvido de tareas.</a:t>
             </a:r>
           </a:p>
           <a:p>
             <a:pPr algn="just"/>
             <a:r>
-              <a:rPr lang="es-MX" dirty="0" smtClean="0"/>
+              <a:rPr lang="es-MX" dirty="0"/>
               <a:t>Se requiere una comunicación con el cliente mas ordenada y que al mismo tiempo el cliente se sienta confiado de que tendrá el apoyo necesario, con un sistema se podrá justificar fácilmente el porque se requiere de tiempo para atender ciertas tareas.</a:t>
             </a:r>
           </a:p>
           <a:p>
             <a:pPr algn="just"/>
             <a:r>
-              <a:rPr lang="es-MX" dirty="0" smtClean="0"/>
+              <a:rPr lang="es-MX" dirty="0"/>
               <a:t>Aunado al soporte técnico, también podremos tener en observación los dispositivos que el cliente o trabajador tiene a cargo o que se les han asignado.</a:t>
             </a:r>
           </a:p>
@@ -4180,26 +5804,22 @@
           <a:p>
             <a:pPr algn="ctr"/>
             <a:r>
-              <a:rPr lang="es-MX" dirty="0" smtClean="0"/>
+              <a:rPr lang="es-MX" dirty="0"/>
               <a:t>¿Qué puede hacer un usuario del </a:t>
             </a:r>
             <a:r>
-              <a:rPr lang="es-MX" dirty="0" err="1" smtClean="0"/>
+              <a:rPr lang="es-MX" dirty="0" err="1"/>
               <a:t>help-desk</a:t>
             </a:r>
             <a:r>
-              <a:rPr lang="es-MX" dirty="0" smtClean="0"/>
+              <a:rPr lang="es-MX" dirty="0"/>
               <a:t>?</a:t>
             </a:r>
             <a:br>
-              <a:rPr lang="es-MX" dirty="0" smtClean="0"/>
+              <a:rPr lang="es-MX" dirty="0"/>
             </a:br>
-            <a:r>
-              <a:rPr lang="es-MX" dirty="0" smtClean="0"/>
-              <a:t/>
-            </a:r>
             <a:br>
-              <a:rPr lang="es-MX" dirty="0" smtClean="0"/>
+              <a:rPr lang="es-MX" dirty="0"/>
             </a:br>
             <a:endParaRPr lang="es-MX" dirty="0"/>
           </a:p>
@@ -4513,87 +6133,119 @@
           <a:p>
             <a:pPr algn="just"/>
             <a:r>
-              <a:rPr lang="es-MX" dirty="0" smtClean="0"/>
+              <a:rPr lang="es-MX" dirty="0"/>
               <a:t>El sistema tendrá dos tipos de usuarios:</a:t>
             </a:r>
           </a:p>
           <a:p>
-            <a:pPr algn="just"/>
-            <a:r>
-              <a:rPr lang="es-MX" dirty="0" smtClean="0"/>
+            <a:pPr marL="457200" indent="-457200" algn="just">
+              <a:buFont typeface="+mj-lt"/>
+              <a:buAutoNum type="arabicPeriod"/>
+            </a:pPr>
+            <a:r>
+              <a:rPr lang="es-MX" dirty="0"/>
               <a:t>Cliente:</a:t>
             </a:r>
           </a:p>
           <a:p>
-            <a:pPr lvl="1" algn="just"/>
-            <a:r>
-              <a:rPr lang="es-MX" dirty="0" smtClean="0"/>
+            <a:pPr marL="845820" lvl="1" indent="-342900" algn="just">
+              <a:buFont typeface="+mj-lt"/>
+              <a:buAutoNum type="alphaUcPeriod"/>
+            </a:pPr>
+            <a:r>
+              <a:rPr lang="es-MX" dirty="0"/>
               <a:t>Iniciar sesión en sistema.</a:t>
             </a:r>
           </a:p>
           <a:p>
-            <a:pPr lvl="1" algn="just"/>
-            <a:r>
-              <a:rPr lang="es-MX" dirty="0" smtClean="0"/>
+            <a:pPr marL="845820" lvl="1" indent="-342900" algn="just">
+              <a:buFont typeface="+mj-lt"/>
+              <a:buAutoNum type="alphaUcPeriod"/>
+            </a:pPr>
+            <a:r>
+              <a:rPr lang="es-MX" dirty="0"/>
               <a:t>Puede ver sus datos personales y editarlos.</a:t>
             </a:r>
           </a:p>
           <a:p>
-            <a:pPr lvl="1" algn="just"/>
-            <a:r>
-              <a:rPr lang="es-MX" dirty="0" smtClean="0"/>
+            <a:pPr marL="845820" lvl="1" indent="-342900" algn="just">
+              <a:buFont typeface="+mj-lt"/>
+              <a:buAutoNum type="alphaUcPeriod"/>
+            </a:pPr>
+            <a:r>
+              <a:rPr lang="es-MX" dirty="0"/>
               <a:t>Puede ver los dispositivos que le fueron asignados.</a:t>
             </a:r>
           </a:p>
           <a:p>
-            <a:pPr lvl="1" algn="just"/>
-            <a:r>
-              <a:rPr lang="es-MX" dirty="0" smtClean="0"/>
+            <a:pPr marL="845820" lvl="1" indent="-342900" algn="just">
+              <a:buFont typeface="+mj-lt"/>
+              <a:buAutoNum type="alphaUcPeriod"/>
+            </a:pPr>
+            <a:r>
+              <a:rPr lang="es-MX" dirty="0"/>
               <a:t>Puede levantar reportes a soporte técnico, a partir de la lista de dispositivos asignados.</a:t>
             </a:r>
           </a:p>
           <a:p>
-            <a:pPr lvl="1" algn="just"/>
-            <a:r>
-              <a:rPr lang="es-MX" dirty="0" smtClean="0"/>
+            <a:pPr marL="845820" lvl="1" indent="-342900" algn="just">
+              <a:buFont typeface="+mj-lt"/>
+              <a:buAutoNum type="alphaUcPeriod"/>
+            </a:pPr>
+            <a:r>
+              <a:rPr lang="es-MX" dirty="0"/>
               <a:t>Puede obtener reportes de su histórico de reportes a soporte técnico.</a:t>
             </a:r>
           </a:p>
           <a:p>
-            <a:pPr algn="just"/>
-            <a:r>
-              <a:rPr lang="es-MX" dirty="0" smtClean="0"/>
+            <a:pPr marL="457200" indent="-457200" algn="just">
+              <a:buFont typeface="+mj-lt"/>
+              <a:buAutoNum type="arabicPeriod"/>
+            </a:pPr>
+            <a:r>
+              <a:rPr lang="es-MX" dirty="0"/>
               <a:t>Administrador:</a:t>
             </a:r>
           </a:p>
           <a:p>
-            <a:pPr lvl="1" algn="just"/>
-            <a:r>
-              <a:rPr lang="es-MX" dirty="0" smtClean="0"/>
+            <a:pPr marL="845820" lvl="1" indent="-342900" algn="just">
+              <a:buFont typeface="+mj-lt"/>
+              <a:buAutoNum type="alphaUcPeriod"/>
+            </a:pPr>
+            <a:r>
+              <a:rPr lang="es-MX" dirty="0"/>
               <a:t>Iniciar sesión en sistema.</a:t>
             </a:r>
           </a:p>
           <a:p>
-            <a:pPr lvl="1" algn="just"/>
-            <a:r>
-              <a:rPr lang="es-MX" dirty="0" smtClean="0"/>
+            <a:pPr marL="845820" lvl="1" indent="-342900" algn="just">
+              <a:buFont typeface="+mj-lt"/>
+              <a:buAutoNum type="alphaUcPeriod"/>
+            </a:pPr>
+            <a:r>
+              <a:rPr lang="es-MX" dirty="0"/>
               <a:t>Puede gestionar usuarios.</a:t>
             </a:r>
           </a:p>
           <a:p>
-            <a:pPr lvl="1" algn="just"/>
-            <a:r>
-              <a:rPr lang="es-MX" dirty="0" smtClean="0"/>
+            <a:pPr marL="845820" lvl="1" indent="-342900" algn="just">
+              <a:buFont typeface="+mj-lt"/>
+              <a:buAutoNum type="alphaUcPeriod"/>
+            </a:pPr>
+            <a:r>
+              <a:rPr lang="es-MX" dirty="0"/>
               <a:t>Puede asignar dispositivos a usuarios.</a:t>
             </a:r>
           </a:p>
           <a:p>
-            <a:pPr lvl="1" algn="just"/>
-            <a:r>
-              <a:rPr lang="es-MX" dirty="0" smtClean="0"/>
+            <a:pPr marL="845820" lvl="1" indent="-342900" algn="just">
+              <a:buFont typeface="+mj-lt"/>
+              <a:buAutoNum type="alphaUcPeriod"/>
+            </a:pPr>
+            <a:r>
+              <a:rPr lang="es-MX" dirty="0"/>
               <a:t>Puede revisar y responder reportes generados por los usuarios.</a:t>
             </a:r>
-            <a:endParaRPr lang="es-MX" dirty="0" smtClean="0"/>
           </a:p>
         </p:txBody>
       </p:sp>
@@ -4643,10 +6295,9 @@
           <a:lstStyle/>
           <a:p>
             <a:r>
-              <a:rPr lang="es-MX" dirty="0" smtClean="0"/>
+              <a:rPr lang="es-MX" dirty="0"/>
               <a:t>Inicio de sesión del sistema.</a:t>
             </a:r>
-            <a:endParaRPr lang="es-MX" dirty="0"/>
           </a:p>
         </p:txBody>
       </p:sp>
@@ -4723,10 +6374,9 @@
           <a:p>
             <a:pPr algn="ctr"/>
             <a:r>
-              <a:rPr lang="es-MX" dirty="0" smtClean="0"/>
+              <a:rPr lang="es-MX" dirty="0"/>
               <a:t>Usuario</a:t>
             </a:r>
-            <a:endParaRPr lang="es-MX" dirty="0"/>
           </a:p>
         </p:txBody>
       </p:sp>
@@ -4765,7 +6415,7 @@
           <a:p>
             <a:pPr algn="ctr"/>
             <a:r>
-              <a:rPr lang="es-MX" dirty="0" err="1" smtClean="0"/>
+              <a:rPr lang="es-MX" dirty="0" err="1"/>
               <a:t>Password</a:t>
             </a:r>
             <a:endParaRPr lang="es-MX" dirty="0"/>
@@ -4809,10 +6459,9 @@
           <a:p>
             <a:pPr algn="ctr"/>
             <a:r>
-              <a:rPr lang="es-MX" dirty="0" smtClean="0"/>
+              <a:rPr lang="es-MX" dirty="0"/>
               <a:t>Entrar</a:t>
             </a:r>
-            <a:endParaRPr lang="es-MX" dirty="0"/>
           </a:p>
         </p:txBody>
       </p:sp>
@@ -4868,18 +6517,13 @@
           <a:lstStyle/>
           <a:p>
             <a:r>
-              <a:rPr lang="es-MX" sz="1400" u="sng" dirty="0" smtClean="0">
+              <a:rPr lang="es-MX" sz="1400" u="sng" dirty="0">
                 <a:solidFill>
                   <a:srgbClr val="00B0F0"/>
                 </a:solidFill>
               </a:rPr>
               <a:t>Contactar con el administrador</a:t>
             </a:r>
-            <a:endParaRPr lang="es-MX" sz="1400" u="sng" dirty="0">
-              <a:solidFill>
-                <a:srgbClr val="00B0F0"/>
-              </a:solidFill>
-            </a:endParaRPr>
           </a:p>
         </p:txBody>
       </p:sp>
@@ -4920,18 +6564,17 @@
           <a:p>
             <a:pPr algn="just"/>
             <a:r>
-              <a:rPr lang="es-MX" dirty="0" smtClean="0"/>
+              <a:rPr lang="es-MX" dirty="0"/>
               <a:t>Cualquier usuario sin importar el rol podrá hacer </a:t>
             </a:r>
             <a:r>
-              <a:rPr lang="es-MX" dirty="0" err="1" smtClean="0"/>
+              <a:rPr lang="es-MX" dirty="0" err="1"/>
               <a:t>login</a:t>
             </a:r>
             <a:r>
-              <a:rPr lang="es-MX" dirty="0" smtClean="0"/>
+              <a:rPr lang="es-MX" dirty="0"/>
               <a:t> desde el mismo lugar, cliente y administrador.</a:t>
             </a:r>
-            <a:endParaRPr lang="es-MX" dirty="0"/>
           </a:p>
         </p:txBody>
       </p:sp>
@@ -4972,10 +6615,9 @@
           <a:p>
             <a:pPr algn="just"/>
             <a:r>
-              <a:rPr lang="es-MX" dirty="0" smtClean="0"/>
+              <a:rPr lang="es-MX" dirty="0"/>
               <a:t>El link de contactar con el administrador sirve para llamar al administrador que me puede agregar al sistema si aun no existe la credencial.</a:t>
             </a:r>
-            <a:endParaRPr lang="es-MX" dirty="0"/>
           </a:p>
         </p:txBody>
       </p:sp>
@@ -5026,10 +6668,9 @@
           <a:p>
             <a:pPr algn="ctr"/>
             <a:r>
-              <a:rPr lang="es-MX" dirty="0" smtClean="0"/>
+              <a:rPr lang="es-MX" dirty="0"/>
               <a:t>Administrador- Gestión de usuarios</a:t>
             </a:r>
-            <a:endParaRPr lang="es-MX" dirty="0"/>
           </a:p>
         </p:txBody>
       </p:sp>
@@ -5108,10 +6749,9 @@
           <a:p>
             <a:pPr algn="ctr"/>
             <a:r>
-              <a:rPr lang="es-MX" dirty="0" smtClean="0"/>
+              <a:rPr lang="es-MX" dirty="0"/>
               <a:t>Agregar nuevo</a:t>
             </a:r>
-            <a:endParaRPr lang="es-MX" dirty="0"/>
           </a:p>
         </p:txBody>
       </p:sp>
@@ -5150,10 +6790,9 @@
           <a:p>
             <a:pPr algn="ctr"/>
             <a:r>
-              <a:rPr lang="es-MX" dirty="0" smtClean="0"/>
+              <a:rPr lang="es-MX" dirty="0"/>
               <a:t>Paterno</a:t>
             </a:r>
-            <a:endParaRPr lang="es-MX" dirty="0"/>
           </a:p>
         </p:txBody>
       </p:sp>
@@ -5192,10 +6831,9 @@
           <a:p>
             <a:pPr algn="ctr"/>
             <a:r>
-              <a:rPr lang="es-MX" dirty="0" smtClean="0"/>
+              <a:rPr lang="es-MX" dirty="0"/>
               <a:t>Materno</a:t>
             </a:r>
-            <a:endParaRPr lang="es-MX" dirty="0"/>
           </a:p>
         </p:txBody>
       </p:sp>
@@ -5234,10 +6872,9 @@
           <a:p>
             <a:pPr algn="ctr"/>
             <a:r>
-              <a:rPr lang="es-MX" dirty="0" smtClean="0"/>
+              <a:rPr lang="es-MX" dirty="0"/>
               <a:t>Nombre</a:t>
             </a:r>
-            <a:endParaRPr lang="es-MX" dirty="0"/>
           </a:p>
         </p:txBody>
       </p:sp>
@@ -5276,11 +6913,11 @@
           <a:p>
             <a:pPr algn="ctr"/>
             <a:r>
-              <a:rPr lang="es-MX" dirty="0" smtClean="0"/>
+              <a:rPr lang="es-MX" dirty="0"/>
               <a:t>Fecha </a:t>
             </a:r>
             <a:r>
-              <a:rPr lang="es-MX" dirty="0" err="1" smtClean="0"/>
+              <a:rPr lang="es-MX" dirty="0" err="1"/>
               <a:t>Nac</a:t>
             </a:r>
             <a:endParaRPr lang="es-MX" dirty="0"/>
@@ -5322,10 +6959,9 @@
           <a:p>
             <a:pPr algn="ctr"/>
             <a:r>
-              <a:rPr lang="es-MX" dirty="0" smtClean="0"/>
+              <a:rPr lang="es-MX" dirty="0"/>
               <a:t>Sexo</a:t>
             </a:r>
-            <a:endParaRPr lang="es-MX" dirty="0"/>
           </a:p>
         </p:txBody>
       </p:sp>
@@ -5364,10 +7000,9 @@
           <a:p>
             <a:pPr algn="ctr"/>
             <a:r>
-              <a:rPr lang="es-MX" dirty="0" smtClean="0"/>
+              <a:rPr lang="es-MX" dirty="0"/>
               <a:t>Teléfono</a:t>
             </a:r>
-            <a:endParaRPr lang="es-MX" dirty="0"/>
           </a:p>
         </p:txBody>
       </p:sp>
@@ -5406,10 +7041,9 @@
           <a:p>
             <a:pPr algn="ctr"/>
             <a:r>
-              <a:rPr lang="es-MX" dirty="0" smtClean="0"/>
+              <a:rPr lang="es-MX" dirty="0"/>
               <a:t>Correo</a:t>
             </a:r>
-            <a:endParaRPr lang="es-MX" dirty="0"/>
           </a:p>
         </p:txBody>
       </p:sp>
@@ -5448,10 +7082,9 @@
           <a:p>
             <a:pPr algn="ctr"/>
             <a:r>
-              <a:rPr lang="es-MX" dirty="0" smtClean="0"/>
+              <a:rPr lang="es-MX" dirty="0"/>
               <a:t>Usuario</a:t>
             </a:r>
-            <a:endParaRPr lang="es-MX" dirty="0"/>
           </a:p>
         </p:txBody>
       </p:sp>
@@ -5490,7 +7123,7 @@
           <a:p>
             <a:pPr algn="ctr"/>
             <a:r>
-              <a:rPr lang="es-MX" dirty="0" err="1" smtClean="0"/>
+              <a:rPr lang="es-MX" dirty="0" err="1"/>
               <a:t>Password</a:t>
             </a:r>
             <a:endParaRPr lang="es-MX" dirty="0"/>
@@ -5532,18 +7165,17 @@
           <a:p>
             <a:pPr algn="ctr"/>
             <a:r>
-              <a:rPr lang="es-MX" dirty="0" smtClean="0"/>
+              <a:rPr lang="es-MX" dirty="0"/>
               <a:t>Describir ubicación – Oficina, Piso, Cuarto, Dirección </a:t>
             </a:r>
             <a:r>
-              <a:rPr lang="es-MX" dirty="0" err="1" smtClean="0"/>
+              <a:rPr lang="es-MX" dirty="0" err="1"/>
               <a:t>ect</a:t>
             </a:r>
             <a:r>
-              <a:rPr lang="es-MX" dirty="0" smtClean="0"/>
+              <a:rPr lang="es-MX" dirty="0"/>
               <a:t> …</a:t>
             </a:r>
-            <a:endParaRPr lang="es-MX" dirty="0"/>
           </a:p>
         </p:txBody>
       </p:sp>
@@ -5570,7 +7202,7 @@
           <a:lstStyle/>
           <a:p>
             <a:r>
-              <a:rPr lang="es-MX" dirty="0" smtClean="0">
+              <a:rPr lang="es-MX" dirty="0">
                 <a:ln w="0"/>
                 <a:effectLst>
                   <a:outerShdw blurRad="38100" dist="19050" dir="2700000" algn="tl" rotWithShape="0">
@@ -5582,16 +7214,6 @@
               </a:rPr>
               <a:t>Agregar Nuevo Usuario</a:t>
             </a:r>
-            <a:endParaRPr lang="es-MX" dirty="0">
-              <a:ln w="0"/>
-              <a:effectLst>
-                <a:outerShdw blurRad="38100" dist="19050" dir="2700000" algn="tl" rotWithShape="0">
-                  <a:schemeClr val="dk1">
-                    <a:alpha val="40000"/>
-                  </a:schemeClr>
-                </a:outerShdw>
-              </a:effectLst>
-            </a:endParaRPr>
           </a:p>
         </p:txBody>
       </p:sp>
@@ -5630,10 +7252,9 @@
           <a:p>
             <a:pPr algn="ctr"/>
             <a:r>
-              <a:rPr lang="es-MX" dirty="0" smtClean="0"/>
+              <a:rPr lang="es-MX" dirty="0"/>
               <a:t>Rol de usuario</a:t>
             </a:r>
-            <a:endParaRPr lang="es-MX" dirty="0"/>
           </a:p>
         </p:txBody>
       </p:sp>
@@ -5810,10 +7431,9 @@
                     <a:lstStyle/>
                     <a:p>
                       <a:r>
-                        <a:rPr lang="es-MX" dirty="0" smtClean="0"/>
+                        <a:rPr lang="es-MX" dirty="0"/>
                         <a:t>Paterno</a:t>
                       </a:r>
-                      <a:endParaRPr lang="es-MX" dirty="0"/>
                     </a:p>
                   </a:txBody>
                   <a:tcPr/>
@@ -5824,10 +7444,9 @@
                     <a:lstStyle/>
                     <a:p>
                       <a:r>
-                        <a:rPr lang="es-MX" dirty="0" smtClean="0"/>
+                        <a:rPr lang="es-MX" dirty="0"/>
                         <a:t>Materno</a:t>
                       </a:r>
-                      <a:endParaRPr lang="es-MX" dirty="0"/>
                     </a:p>
                   </a:txBody>
                   <a:tcPr/>
@@ -5838,10 +7457,9 @@
                     <a:lstStyle/>
                     <a:p>
                       <a:r>
-                        <a:rPr lang="es-MX" dirty="0" smtClean="0"/>
+                        <a:rPr lang="es-MX" dirty="0"/>
                         <a:t>Nombre</a:t>
                       </a:r>
-                      <a:endParaRPr lang="es-MX" dirty="0"/>
                     </a:p>
                   </a:txBody>
                   <a:tcPr/>
@@ -5852,10 +7470,9 @@
                     <a:lstStyle/>
                     <a:p>
                       <a:r>
-                        <a:rPr lang="es-MX" dirty="0" smtClean="0"/>
+                        <a:rPr lang="es-MX" dirty="0"/>
                         <a:t>Usuario</a:t>
                       </a:r>
-                      <a:endParaRPr lang="es-MX" dirty="0"/>
                     </a:p>
                   </a:txBody>
                   <a:tcPr/>
@@ -5866,10 +7483,9 @@
                     <a:lstStyle/>
                     <a:p>
                       <a:r>
-                        <a:rPr lang="es-MX" dirty="0" smtClean="0"/>
+                        <a:rPr lang="es-MX" dirty="0"/>
                         <a:t>Habilitar</a:t>
                       </a:r>
-                      <a:endParaRPr lang="es-MX" dirty="0"/>
                     </a:p>
                   </a:txBody>
                   <a:tcPr/>
@@ -5880,10 +7496,9 @@
                     <a:lstStyle/>
                     <a:p>
                       <a:r>
-                        <a:rPr lang="es-MX" dirty="0" smtClean="0"/>
+                        <a:rPr lang="es-MX" dirty="0"/>
                         <a:t>Editar</a:t>
                       </a:r>
-                      <a:endParaRPr lang="es-MX" dirty="0"/>
                     </a:p>
                   </a:txBody>
                   <a:tcPr/>
@@ -5894,10 +7509,9 @@
                     <a:lstStyle/>
                     <a:p>
                       <a:r>
-                        <a:rPr lang="es-MX" dirty="0" smtClean="0"/>
+                        <a:rPr lang="es-MX" dirty="0"/>
                         <a:t>Eliminar</a:t>
                       </a:r>
-                      <a:endParaRPr lang="es-MX" dirty="0"/>
                     </a:p>
                   </a:txBody>
                   <a:tcPr/>
@@ -5955,14 +7569,13 @@
                     <a:lstStyle/>
                     <a:p>
                       <a:r>
-                        <a:rPr lang="es-MX" dirty="0" err="1" smtClean="0"/>
+                        <a:rPr lang="es-MX" dirty="0" err="1"/>
                         <a:t>Hab</a:t>
                       </a:r>
                       <a:r>
-                        <a:rPr lang="es-MX" dirty="0" smtClean="0"/>
+                        <a:rPr lang="es-MX" dirty="0"/>
                         <a:t>/No habilitado</a:t>
                       </a:r>
-                      <a:endParaRPr lang="es-MX" dirty="0"/>
                     </a:p>
                   </a:txBody>
                   <a:tcPr/>
@@ -6020,7 +7633,7 @@
           <a:lstStyle/>
           <a:p>
             <a:r>
-              <a:rPr lang="es-MX" dirty="0" smtClean="0">
+              <a:rPr lang="es-MX" dirty="0">
                 <a:ln w="0"/>
                 <a:effectLst>
                   <a:outerShdw blurRad="38100" dist="19050" dir="2700000" algn="tl" rotWithShape="0">
@@ -6032,16 +7645,6 @@
               </a:rPr>
               <a:t>Tabla de gestión de usuarios</a:t>
             </a:r>
-            <a:endParaRPr lang="es-MX" dirty="0">
-              <a:ln w="0"/>
-              <a:effectLst>
-                <a:outerShdw blurRad="38100" dist="19050" dir="2700000" algn="tl" rotWithShape="0">
-                  <a:schemeClr val="dk1">
-                    <a:alpha val="40000"/>
-                  </a:schemeClr>
-                </a:outerShdw>
-              </a:effectLst>
-            </a:endParaRPr>
           </a:p>
         </p:txBody>
       </p:sp>
@@ -6081,10 +7684,9 @@
           <a:lstStyle/>
           <a:p>
             <a:r>
-              <a:rPr lang="es-MX" dirty="0" smtClean="0"/>
+              <a:rPr lang="es-MX" dirty="0"/>
               <a:t>Solo se puede eliminar en caso de que no tenga datos</a:t>
             </a:r>
-            <a:endParaRPr lang="es-MX" dirty="0"/>
           </a:p>
         </p:txBody>
       </p:sp>
@@ -6124,26 +7726,25 @@
           <a:lstStyle/>
           <a:p>
             <a:r>
-              <a:rPr lang="es-MX" dirty="0" smtClean="0"/>
+              <a:rPr lang="es-MX" dirty="0"/>
               <a:t>Se hará un </a:t>
             </a:r>
             <a:r>
-              <a:rPr lang="es-MX" dirty="0" err="1" smtClean="0"/>
+              <a:rPr lang="es-MX" dirty="0" err="1"/>
               <a:t>datatable</a:t>
             </a:r>
             <a:r>
-              <a:rPr lang="es-MX" dirty="0" smtClean="0"/>
+              <a:rPr lang="es-MX" dirty="0"/>
               <a:t> </a:t>
             </a:r>
             <a:r>
-              <a:rPr lang="es-MX" dirty="0" err="1" smtClean="0"/>
+              <a:rPr lang="es-MX" dirty="0" err="1"/>
               <a:t>responsive</a:t>
             </a:r>
             <a:r>
-              <a:rPr lang="es-MX" dirty="0" smtClean="0"/>
+              <a:rPr lang="es-MX" dirty="0"/>
               <a:t> para poder agregar todos los datos del usuario que sean necesarios.</a:t>
             </a:r>
-            <a:endParaRPr lang="es-MX" dirty="0"/>
           </a:p>
         </p:txBody>
       </p:sp>
@@ -6193,10 +7794,9 @@
           <a:lstStyle/>
           <a:p>
             <a:r>
-              <a:rPr lang="es-MX" dirty="0" smtClean="0"/>
+              <a:rPr lang="es-MX" dirty="0"/>
               <a:t>Administrador – Asignación de dispositivos</a:t>
             </a:r>
-            <a:endParaRPr lang="es-MX" dirty="0"/>
           </a:p>
         </p:txBody>
       </p:sp>
@@ -6209,7 +7809,7 @@
         <p:spPr>
           <a:xfrm>
             <a:off x="4821381" y="1496290"/>
-            <a:ext cx="6093229" cy="3982159"/>
+            <a:ext cx="6093229" cy="4601183"/>
           </a:xfrm>
           <a:prstGeom prst="rect">
             <a:avLst/>
@@ -6261,10 +7861,9 @@
           <a:lstStyle/>
           <a:p>
             <a:r>
-              <a:rPr lang="es-MX" dirty="0" smtClean="0"/>
+              <a:rPr lang="es-MX" dirty="0"/>
               <a:t>Asignación de dispositivos a usuarios </a:t>
             </a:r>
-            <a:endParaRPr lang="es-MX" dirty="0"/>
           </a:p>
         </p:txBody>
       </p:sp>
@@ -6303,10 +7902,9 @@
           <a:p>
             <a:pPr algn="ctr"/>
             <a:r>
-              <a:rPr lang="es-MX" dirty="0" smtClean="0"/>
+              <a:rPr lang="es-MX" dirty="0"/>
               <a:t>Tipo de dispositivo</a:t>
             </a:r>
-            <a:endParaRPr lang="es-MX" dirty="0"/>
           </a:p>
         </p:txBody>
       </p:sp>
@@ -6345,10 +7943,9 @@
           <a:p>
             <a:pPr algn="ctr"/>
             <a:r>
-              <a:rPr lang="es-MX" dirty="0" smtClean="0"/>
+              <a:rPr lang="es-MX" dirty="0"/>
               <a:t>Persona</a:t>
             </a:r>
-            <a:endParaRPr lang="es-MX" dirty="0"/>
           </a:p>
         </p:txBody>
       </p:sp>
@@ -6463,10 +8060,9 @@
           <a:p>
             <a:pPr algn="ctr"/>
             <a:r>
-              <a:rPr lang="es-MX" dirty="0" smtClean="0"/>
+              <a:rPr lang="es-MX" dirty="0"/>
               <a:t>Marca</a:t>
             </a:r>
-            <a:endParaRPr lang="es-MX" dirty="0"/>
           </a:p>
         </p:txBody>
       </p:sp>
@@ -6505,10 +8101,9 @@
           <a:p>
             <a:pPr algn="ctr"/>
             <a:r>
-              <a:rPr lang="es-MX" dirty="0" smtClean="0"/>
+              <a:rPr lang="es-MX" dirty="0"/>
               <a:t>Modelo</a:t>
             </a:r>
-            <a:endParaRPr lang="es-MX" dirty="0"/>
           </a:p>
         </p:txBody>
       </p:sp>
@@ -6547,10 +8142,9 @@
           <a:p>
             <a:pPr algn="ctr"/>
             <a:r>
-              <a:rPr lang="es-MX" dirty="0" smtClean="0"/>
+              <a:rPr lang="es-MX" dirty="0"/>
               <a:t>Color</a:t>
             </a:r>
-            <a:endParaRPr lang="es-MX" dirty="0"/>
           </a:p>
         </p:txBody>
       </p:sp>
@@ -6589,7 +8183,7 @@
           <a:p>
             <a:pPr algn="ctr"/>
             <a:r>
-              <a:rPr lang="es-MX" dirty="0" err="1" smtClean="0"/>
+              <a:rPr lang="es-MX" dirty="0" err="1"/>
               <a:t>Descripcion</a:t>
             </a:r>
             <a:r>
@@ -6664,10 +8258,9 @@
           <a:p>
             <a:pPr algn="ctr"/>
             <a:r>
-              <a:rPr lang="es-MX" dirty="0" smtClean="0"/>
+              <a:rPr lang="es-MX" dirty="0"/>
               <a:t>Memoria</a:t>
             </a:r>
-            <a:endParaRPr lang="es-MX" dirty="0"/>
           </a:p>
         </p:txBody>
       </p:sp>
@@ -6706,10 +8299,9 @@
           <a:p>
             <a:pPr algn="ctr"/>
             <a:r>
-              <a:rPr lang="es-MX" dirty="0" smtClean="0"/>
+              <a:rPr lang="es-MX" dirty="0"/>
               <a:t>Disco duro</a:t>
             </a:r>
-            <a:endParaRPr lang="es-MX" dirty="0"/>
           </a:p>
         </p:txBody>
       </p:sp>
@@ -6748,10 +8340,9 @@
           <a:p>
             <a:pPr algn="ctr"/>
             <a:r>
-              <a:rPr lang="es-MX" dirty="0" smtClean="0"/>
+              <a:rPr lang="es-MX" dirty="0"/>
               <a:t>Procesador</a:t>
             </a:r>
-            <a:endParaRPr lang="es-MX" dirty="0"/>
           </a:p>
         </p:txBody>
       </p:sp>
@@ -6763,7 +8354,7 @@
         </p:nvSpPr>
         <p:spPr>
           <a:xfrm>
-            <a:off x="5083231" y="4981173"/>
+            <a:off x="5083231" y="5528131"/>
             <a:ext cx="1886989" cy="390698"/>
           </a:xfrm>
           <a:prstGeom prst="roundRect">
@@ -6792,10 +8383,56 @@
           <a:p>
             <a:pPr algn="ctr"/>
             <a:r>
-              <a:rPr lang="es-MX" dirty="0" smtClean="0"/>
+              <a:rPr lang="es-MX" dirty="0"/>
               <a:t>Agregar nuevo</a:t>
             </a:r>
-            <a:endParaRPr lang="es-MX" dirty="0"/>
+          </a:p>
+        </p:txBody>
+      </p:sp>
+      <p:sp>
+        <p:nvSpPr>
+          <p:cNvPr id="3" name="Rectángulo: esquinas redondeadas 2">
+            <a:extLst>
+              <a:ext uri="{FF2B5EF4-FFF2-40B4-BE49-F238E27FC236}">
+                <a16:creationId xmlns:a16="http://schemas.microsoft.com/office/drawing/2014/main" id="{D4A80118-8B8A-4176-B703-598C30B1B005}"/>
+              </a:ext>
+            </a:extLst>
+          </p:cNvPr>
+          <p:cNvSpPr/>
+          <p:nvPr/>
+        </p:nvSpPr>
+        <p:spPr>
+          <a:xfrm>
+            <a:off x="4994909" y="4924338"/>
+            <a:ext cx="5830340" cy="376786"/>
+          </a:xfrm>
+          <a:prstGeom prst="roundRect">
+            <a:avLst/>
+          </a:prstGeom>
+        </p:spPr>
+        <p:style>
+          <a:lnRef idx="2">
+            <a:schemeClr val="dk1"/>
+          </a:lnRef>
+          <a:fillRef idx="1">
+            <a:schemeClr val="lt1"/>
+          </a:fillRef>
+          <a:effectRef idx="0">
+            <a:schemeClr val="dk1"/>
+          </a:effectRef>
+          <a:fontRef idx="minor">
+            <a:schemeClr val="dk1"/>
+          </a:fontRef>
+        </p:style>
+        <p:txBody>
+          <a:bodyPr rtlCol="0" anchor="ctr"/>
+          <a:lstStyle/>
+          <a:p>
+            <a:pPr algn="ctr"/>
+            <a:r>
+              <a:rPr lang="es-MX" dirty="0"/>
+              <a:t>Adjuntar imagen / opcional</a:t>
+            </a:r>
           </a:p>
         </p:txBody>
       </p:sp>
@@ -6874,7 +8511,7 @@
           <a:lstStyle/>
           <a:p>
             <a:r>
-              <a:rPr lang="es-MX" dirty="0" smtClean="0">
+              <a:rPr lang="es-MX" dirty="0">
                 <a:ln w="0"/>
                 <a:effectLst>
                   <a:outerShdw blurRad="38100" dist="19050" dir="2700000" algn="tl" rotWithShape="0">
@@ -6886,16 +8523,6 @@
               </a:rPr>
               <a:t>Tabla de gestión de dispositivos de personas</a:t>
             </a:r>
-            <a:endParaRPr lang="es-MX" dirty="0">
-              <a:ln w="0"/>
-              <a:effectLst>
-                <a:outerShdw blurRad="38100" dist="19050" dir="2700000" algn="tl" rotWithShape="0">
-                  <a:schemeClr val="dk1">
-                    <a:alpha val="40000"/>
-                  </a:schemeClr>
-                </a:outerShdw>
-              </a:effectLst>
-            </a:endParaRPr>
           </a:p>
         </p:txBody>
       </p:sp>
@@ -6967,10 +8594,9 @@
                     <a:lstStyle/>
                     <a:p>
                       <a:r>
-                        <a:rPr lang="es-MX" dirty="0" smtClean="0"/>
+                        <a:rPr lang="es-MX" dirty="0"/>
                         <a:t>Paterno</a:t>
                       </a:r>
-                      <a:endParaRPr lang="es-MX" dirty="0"/>
                     </a:p>
                   </a:txBody>
                   <a:tcPr/>
@@ -6981,10 +8607,9 @@
                     <a:lstStyle/>
                     <a:p>
                       <a:r>
-                        <a:rPr lang="es-MX" dirty="0" smtClean="0"/>
+                        <a:rPr lang="es-MX" dirty="0"/>
                         <a:t>Materno</a:t>
                       </a:r>
-                      <a:endParaRPr lang="es-MX" dirty="0"/>
                     </a:p>
                   </a:txBody>
                   <a:tcPr/>
@@ -6995,10 +8620,9 @@
                     <a:lstStyle/>
                     <a:p>
                       <a:r>
-                        <a:rPr lang="es-MX" dirty="0" smtClean="0"/>
+                        <a:rPr lang="es-MX" dirty="0"/>
                         <a:t>Nombre</a:t>
                       </a:r>
-                      <a:endParaRPr lang="es-MX" dirty="0"/>
                     </a:p>
                   </a:txBody>
                   <a:tcPr/>
@@ -7009,10 +8633,9 @@
                     <a:lstStyle/>
                     <a:p>
                       <a:r>
-                        <a:rPr lang="es-MX" dirty="0" smtClean="0"/>
+                        <a:rPr lang="es-MX" dirty="0"/>
                         <a:t>Dispositivo</a:t>
                       </a:r>
-                      <a:endParaRPr lang="es-MX" dirty="0"/>
                     </a:p>
                   </a:txBody>
                   <a:tcPr/>
@@ -7023,10 +8646,9 @@
                     <a:lstStyle/>
                     <a:p>
                       <a:r>
-                        <a:rPr lang="es-MX" dirty="0" smtClean="0"/>
+                        <a:rPr lang="es-MX" dirty="0"/>
                         <a:t>Eliminar</a:t>
                       </a:r>
-                      <a:endParaRPr lang="es-MX" dirty="0"/>
                     </a:p>
                   </a:txBody>
                   <a:tcPr/>
@@ -7134,10 +8756,9 @@
           <a:lstStyle/>
           <a:p>
             <a:r>
-              <a:rPr lang="es-MX" dirty="0" smtClean="0"/>
+              <a:rPr lang="es-MX" dirty="0"/>
               <a:t>Solo dejamos la opción de eliminar, porque agregar la opción de editar haría mas tardado el desarrollo y con el botón de eliminar funcionaria perfectamente para su fin.</a:t>
             </a:r>
-            <a:endParaRPr lang="es-MX" dirty="0"/>
           </a:p>
         </p:txBody>
       </p:sp>
@@ -7188,36 +8809,737 @@
           <a:p>
             <a:pPr algn="ctr"/>
             <a:r>
-              <a:rPr lang="es-MX" dirty="0" smtClean="0"/>
-              <a:t>Administrador – Reportes soporte </a:t>
-            </a:r>
-            <a:r>
-              <a:rPr lang="es-MX" dirty="0" err="1" smtClean="0"/>
-              <a:t>tecnico</a:t>
-            </a:r>
-            <a:endParaRPr lang="es-MX" dirty="0"/>
-          </a:p>
-        </p:txBody>
-      </p:sp>
-      <p:sp>
-        <p:nvSpPr>
-          <p:cNvPr id="3" name="Marcador de contenido 2"/>
-          <p:cNvSpPr>
-            <a:spLocks noGrp="1"/>
-          </p:cNvSpPr>
+              <a:rPr lang="es-MX" dirty="0"/>
+              <a:t>Administrador – Reportes soporte técnico</a:t>
+            </a:r>
+          </a:p>
+        </p:txBody>
+      </p:sp>
+      <p:sp>
+        <p:nvSpPr>
+          <p:cNvPr id="4" name="CuadroTexto 3">
+            <a:extLst>
+              <a:ext uri="{FF2B5EF4-FFF2-40B4-BE49-F238E27FC236}">
+                <a16:creationId xmlns:a16="http://schemas.microsoft.com/office/drawing/2014/main" id="{0C7CD8E4-4862-49C1-BCEA-172E22C722BB}"/>
+              </a:ext>
+            </a:extLst>
+          </p:cNvPr>
+          <p:cNvSpPr txBox="1"/>
+          <p:nvPr/>
+        </p:nvSpPr>
+        <p:spPr>
+          <a:xfrm>
+            <a:off x="6031684" y="754505"/>
+            <a:ext cx="3242362" cy="369332"/>
+          </a:xfrm>
+          <a:prstGeom prst="rect">
+            <a:avLst/>
+          </a:prstGeom>
+          <a:noFill/>
+        </p:spPr>
+        <p:txBody>
+          <a:bodyPr wrap="none" rtlCol="0">
+            <a:spAutoFit/>
+          </a:bodyPr>
+          <a:lstStyle/>
+          <a:p>
+            <a:r>
+              <a:rPr lang="es-MX" dirty="0">
+                <a:ln w="0"/>
+                <a:effectLst>
+                  <a:outerShdw blurRad="38100" dist="19050" dir="2700000" algn="tl" rotWithShape="0">
+                    <a:schemeClr val="dk1">
+                      <a:alpha val="40000"/>
+                    </a:schemeClr>
+                  </a:outerShdw>
+                </a:effectLst>
+              </a:rPr>
+              <a:t>Revisión de reportes de usuarios</a:t>
+            </a:r>
+          </a:p>
+        </p:txBody>
+      </p:sp>
+      <p:graphicFrame>
+        <p:nvGraphicFramePr>
+          <p:cNvPr id="6" name="Tabla 6">
+            <a:extLst>
+              <a:ext uri="{FF2B5EF4-FFF2-40B4-BE49-F238E27FC236}">
+                <a16:creationId xmlns:a16="http://schemas.microsoft.com/office/drawing/2014/main" id="{67039E69-99BD-4546-8B23-CFE2C2CB04BD}"/>
+              </a:ext>
+            </a:extLst>
+          </p:cNvPr>
+          <p:cNvGraphicFramePr>
+            <a:graphicFrameLocks noGrp="1"/>
+          </p:cNvGraphicFramePr>
           <p:nvPr>
-            <p:ph idx="1"/>
+            <p:extLst>
+              <p:ext uri="{D42A27DB-BD31-4B8C-83A1-F6EECF244321}">
+                <p14:modId xmlns:p14="http://schemas.microsoft.com/office/powerpoint/2010/main" val="477702731"/>
+              </p:ext>
+            </p:extLst>
           </p:nvPr>
-        </p:nvSpPr>
-        <p:spPr/>
-        <p:txBody>
-          <a:bodyPr/>
-          <a:lstStyle/>
-          <a:p>
+        </p:nvGraphicFramePr>
+        <p:xfrm>
+          <a:off x="3588864" y="1431981"/>
+          <a:ext cx="8128001" cy="1249680"/>
+        </p:xfrm>
+        <a:graphic>
+          <a:graphicData uri="http://schemas.openxmlformats.org/drawingml/2006/table">
+            <a:tbl>
+              <a:tblPr firstRow="1" bandRow="1">
+                <a:tableStyleId>{5C22544A-7EE6-4342-B048-85BDC9FD1C3A}</a:tableStyleId>
+              </a:tblPr>
+              <a:tblGrid>
+                <a:gridCol w="1161143">
+                  <a:extLst>
+                    <a:ext uri="{9D8B030D-6E8A-4147-A177-3AD203B41FA5}">
+                      <a16:colId xmlns:a16="http://schemas.microsoft.com/office/drawing/2014/main" val="4131704958"/>
+                    </a:ext>
+                  </a:extLst>
+                </a:gridCol>
+                <a:gridCol w="1161143">
+                  <a:extLst>
+                    <a:ext uri="{9D8B030D-6E8A-4147-A177-3AD203B41FA5}">
+                      <a16:colId xmlns:a16="http://schemas.microsoft.com/office/drawing/2014/main" val="795825264"/>
+                    </a:ext>
+                  </a:extLst>
+                </a:gridCol>
+                <a:gridCol w="1161143">
+                  <a:extLst>
+                    <a:ext uri="{9D8B030D-6E8A-4147-A177-3AD203B41FA5}">
+                      <a16:colId xmlns:a16="http://schemas.microsoft.com/office/drawing/2014/main" val="913680043"/>
+                    </a:ext>
+                  </a:extLst>
+                </a:gridCol>
+                <a:gridCol w="1161143">
+                  <a:extLst>
+                    <a:ext uri="{9D8B030D-6E8A-4147-A177-3AD203B41FA5}">
+                      <a16:colId xmlns:a16="http://schemas.microsoft.com/office/drawing/2014/main" val="676198340"/>
+                    </a:ext>
+                  </a:extLst>
+                </a:gridCol>
+                <a:gridCol w="1161143">
+                  <a:extLst>
+                    <a:ext uri="{9D8B030D-6E8A-4147-A177-3AD203B41FA5}">
+                      <a16:colId xmlns:a16="http://schemas.microsoft.com/office/drawing/2014/main" val="358832056"/>
+                    </a:ext>
+                  </a:extLst>
+                </a:gridCol>
+                <a:gridCol w="1161143">
+                  <a:extLst>
+                    <a:ext uri="{9D8B030D-6E8A-4147-A177-3AD203B41FA5}">
+                      <a16:colId xmlns:a16="http://schemas.microsoft.com/office/drawing/2014/main" val="480121418"/>
+                    </a:ext>
+                  </a:extLst>
+                </a:gridCol>
+                <a:gridCol w="1161143">
+                  <a:extLst>
+                    <a:ext uri="{9D8B030D-6E8A-4147-A177-3AD203B41FA5}">
+                      <a16:colId xmlns:a16="http://schemas.microsoft.com/office/drawing/2014/main" val="3327303841"/>
+                    </a:ext>
+                  </a:extLst>
+                </a:gridCol>
+              </a:tblGrid>
+              <a:tr h="370840">
+                <a:tc>
+                  <a:txBody>
+                    <a:bodyPr/>
+                    <a:lstStyle/>
+                    <a:p>
+                      <a:r>
+                        <a:rPr lang="es-MX" sz="1400" dirty="0"/>
+                        <a:t>Paterno</a:t>
+                      </a:r>
+                    </a:p>
+                  </a:txBody>
+                  <a:tcPr/>
+                </a:tc>
+                <a:tc>
+                  <a:txBody>
+                    <a:bodyPr/>
+                    <a:lstStyle/>
+                    <a:p>
+                      <a:r>
+                        <a:rPr lang="es-MX" sz="1400" dirty="0"/>
+                        <a:t>Materno</a:t>
+                      </a:r>
+                    </a:p>
+                  </a:txBody>
+                  <a:tcPr/>
+                </a:tc>
+                <a:tc>
+                  <a:txBody>
+                    <a:bodyPr/>
+                    <a:lstStyle/>
+                    <a:p>
+                      <a:r>
+                        <a:rPr lang="es-MX" sz="1400" dirty="0"/>
+                        <a:t>Nombre</a:t>
+                      </a:r>
+                    </a:p>
+                  </a:txBody>
+                  <a:tcPr/>
+                </a:tc>
+                <a:tc>
+                  <a:txBody>
+                    <a:bodyPr/>
+                    <a:lstStyle/>
+                    <a:p>
+                      <a:r>
+                        <a:rPr lang="es-MX" sz="1400" dirty="0"/>
+                        <a:t>Dispositivo </a:t>
+                      </a:r>
+                    </a:p>
+                  </a:txBody>
+                  <a:tcPr/>
+                </a:tc>
+                <a:tc>
+                  <a:txBody>
+                    <a:bodyPr/>
+                    <a:lstStyle/>
+                    <a:p>
+                      <a:r>
+                        <a:rPr lang="es-MX" sz="1400" dirty="0"/>
+                        <a:t>Descripción</a:t>
+                      </a:r>
+                    </a:p>
+                  </a:txBody>
+                  <a:tcPr/>
+                </a:tc>
+                <a:tc>
+                  <a:txBody>
+                    <a:bodyPr/>
+                    <a:lstStyle/>
+                    <a:p>
+                      <a:r>
+                        <a:rPr lang="es-MX" sz="1400" dirty="0"/>
+                        <a:t>Estado</a:t>
+                      </a:r>
+                    </a:p>
+                  </a:txBody>
+                  <a:tcPr/>
+                </a:tc>
+                <a:tc>
+                  <a:txBody>
+                    <a:bodyPr/>
+                    <a:lstStyle/>
+                    <a:p>
+                      <a:r>
+                        <a:rPr lang="es-MX" sz="1400" dirty="0"/>
+                        <a:t>Terminar y agregar solución</a:t>
+                      </a:r>
+                    </a:p>
+                  </a:txBody>
+                  <a:tcPr/>
+                </a:tc>
+                <a:extLst>
+                  <a:ext uri="{0D108BD9-81ED-4DB2-BD59-A6C34878D82A}">
+                    <a16:rowId xmlns:a16="http://schemas.microsoft.com/office/drawing/2014/main" val="572544063"/>
+                  </a:ext>
+                </a:extLst>
+              </a:tr>
+              <a:tr h="370840">
+                <a:tc>
+                  <a:txBody>
+                    <a:bodyPr/>
+                    <a:lstStyle/>
+                    <a:p>
+                      <a:endParaRPr lang="es-MX" sz="1400" dirty="0"/>
+                    </a:p>
+                  </a:txBody>
+                  <a:tcPr/>
+                </a:tc>
+                <a:tc>
+                  <a:txBody>
+                    <a:bodyPr/>
+                    <a:lstStyle/>
+                    <a:p>
+                      <a:endParaRPr lang="es-MX" sz="1400" dirty="0"/>
+                    </a:p>
+                  </a:txBody>
+                  <a:tcPr/>
+                </a:tc>
+                <a:tc>
+                  <a:txBody>
+                    <a:bodyPr/>
+                    <a:lstStyle/>
+                    <a:p>
+                      <a:endParaRPr lang="es-MX" sz="1400" dirty="0"/>
+                    </a:p>
+                  </a:txBody>
+                  <a:tcPr/>
+                </a:tc>
+                <a:tc>
+                  <a:txBody>
+                    <a:bodyPr/>
+                    <a:lstStyle/>
+                    <a:p>
+                      <a:endParaRPr lang="es-MX" sz="1400" dirty="0"/>
+                    </a:p>
+                  </a:txBody>
+                  <a:tcPr/>
+                </a:tc>
+                <a:tc>
+                  <a:txBody>
+                    <a:bodyPr/>
+                    <a:lstStyle/>
+                    <a:p>
+                      <a:endParaRPr lang="es-MX" sz="1400" dirty="0"/>
+                    </a:p>
+                  </a:txBody>
+                  <a:tcPr/>
+                </a:tc>
+                <a:tc>
+                  <a:txBody>
+                    <a:bodyPr/>
+                    <a:lstStyle/>
+                    <a:p>
+                      <a:r>
+                        <a:rPr lang="es-MX" sz="1400" dirty="0"/>
+                        <a:t>Abierto / Cerrado</a:t>
+                      </a:r>
+                    </a:p>
+                  </a:txBody>
+                  <a:tcPr/>
+                </a:tc>
+                <a:tc>
+                  <a:txBody>
+                    <a:bodyPr/>
+                    <a:lstStyle/>
+                    <a:p>
+                      <a:r>
+                        <a:rPr lang="es-MX" sz="1400" u="sng" dirty="0">
+                          <a:solidFill>
+                            <a:srgbClr val="0070C0"/>
+                          </a:solidFill>
+                        </a:rPr>
+                        <a:t>Agregar R</a:t>
+                      </a:r>
+                    </a:p>
+                  </a:txBody>
+                  <a:tcPr/>
+                </a:tc>
+                <a:extLst>
+                  <a:ext uri="{0D108BD9-81ED-4DB2-BD59-A6C34878D82A}">
+                    <a16:rowId xmlns:a16="http://schemas.microsoft.com/office/drawing/2014/main" val="1002946339"/>
+                  </a:ext>
+                </a:extLst>
+              </a:tr>
+            </a:tbl>
+          </a:graphicData>
+        </a:graphic>
+      </p:graphicFrame>
+      <p:cxnSp>
+        <p:nvCxnSpPr>
+          <p:cNvPr id="8" name="Conector recto de flecha 7">
+            <a:extLst>
+              <a:ext uri="{FF2B5EF4-FFF2-40B4-BE49-F238E27FC236}">
+                <a16:creationId xmlns:a16="http://schemas.microsoft.com/office/drawing/2014/main" id="{8ED1B916-1870-493A-AFE0-EDF2B2779605}"/>
+              </a:ext>
+            </a:extLst>
+          </p:cNvPr>
+          <p:cNvCxnSpPr>
+            <a:cxnSpLocks/>
+            <a:stCxn id="10" idx="0"/>
+          </p:cNvCxnSpPr>
+          <p:nvPr/>
+        </p:nvCxnSpPr>
+        <p:spPr>
+          <a:xfrm flipV="1">
+            <a:off x="7756035" y="2449587"/>
+            <a:ext cx="3241932" cy="505586"/>
+          </a:xfrm>
+          <a:prstGeom prst="straightConnector1">
+            <a:avLst/>
+          </a:prstGeom>
+          <a:ln>
+            <a:tailEnd type="triangle"/>
+          </a:ln>
+        </p:spPr>
+        <p:style>
+          <a:lnRef idx="1">
+            <a:schemeClr val="accent1"/>
+          </a:lnRef>
+          <a:fillRef idx="0">
+            <a:schemeClr val="accent1"/>
+          </a:fillRef>
+          <a:effectRef idx="0">
+            <a:schemeClr val="accent1"/>
+          </a:effectRef>
+          <a:fontRef idx="minor">
+            <a:schemeClr val="tx1"/>
+          </a:fontRef>
+        </p:style>
+      </p:cxnSp>
+      <p:sp>
+        <p:nvSpPr>
+          <p:cNvPr id="10" name="CuadroTexto 9">
+            <a:extLst>
+              <a:ext uri="{FF2B5EF4-FFF2-40B4-BE49-F238E27FC236}">
+                <a16:creationId xmlns:a16="http://schemas.microsoft.com/office/drawing/2014/main" id="{A5A1A829-B91B-416A-BA98-4629C41D2E06}"/>
+              </a:ext>
+            </a:extLst>
+          </p:cNvPr>
+          <p:cNvSpPr txBox="1"/>
+          <p:nvPr/>
+        </p:nvSpPr>
+        <p:spPr>
+          <a:xfrm>
+            <a:off x="3795205" y="2955173"/>
+            <a:ext cx="7921659" cy="830997"/>
+          </a:xfrm>
+          <a:prstGeom prst="rect">
+            <a:avLst/>
+          </a:prstGeom>
+        </p:spPr>
+        <p:style>
+          <a:lnRef idx="2">
+            <a:schemeClr val="accent1"/>
+          </a:lnRef>
+          <a:fillRef idx="1">
+            <a:schemeClr val="lt1"/>
+          </a:fillRef>
+          <a:effectRef idx="0">
+            <a:schemeClr val="accent1"/>
+          </a:effectRef>
+          <a:fontRef idx="minor">
+            <a:schemeClr val="dk1"/>
+          </a:fontRef>
+        </p:style>
+        <p:txBody>
+          <a:bodyPr wrap="square" rtlCol="0">
+            <a:spAutoFit/>
+          </a:bodyPr>
+          <a:lstStyle/>
+          <a:p>
+            <a:r>
+              <a:rPr lang="es-MX" sz="1600" dirty="0"/>
+              <a:t>Agregamos un link que abrirá un formulario donde podremos agregar la solución y si hemos podido cerrar esta petición, una vez que se haya cerrado no podrá abrirse, el técnico debe estar seguro de que ha terminado, si es necesario el cliente debe abrir otro ticket o reporte</a:t>
+            </a:r>
+          </a:p>
+        </p:txBody>
+      </p:sp>
+      <p:sp>
+        <p:nvSpPr>
+          <p:cNvPr id="12" name="Rectángulo 11">
+            <a:extLst>
+              <a:ext uri="{FF2B5EF4-FFF2-40B4-BE49-F238E27FC236}">
+                <a16:creationId xmlns:a16="http://schemas.microsoft.com/office/drawing/2014/main" id="{5D8399F7-403B-44DD-8533-82363F9BE9C8}"/>
+              </a:ext>
+            </a:extLst>
+          </p:cNvPr>
+          <p:cNvSpPr/>
+          <p:nvPr/>
+        </p:nvSpPr>
+        <p:spPr>
+          <a:xfrm>
+            <a:off x="3959604" y="3972779"/>
+            <a:ext cx="4006156" cy="2430471"/>
+          </a:xfrm>
+          <a:prstGeom prst="rect">
+            <a:avLst/>
+          </a:prstGeom>
+        </p:spPr>
+        <p:style>
+          <a:lnRef idx="2">
+            <a:schemeClr val="accent1"/>
+          </a:lnRef>
+          <a:fillRef idx="1">
+            <a:schemeClr val="lt1"/>
+          </a:fillRef>
+          <a:effectRef idx="0">
+            <a:schemeClr val="accent1"/>
+          </a:effectRef>
+          <a:fontRef idx="minor">
+            <a:schemeClr val="dk1"/>
+          </a:fontRef>
+        </p:style>
+        <p:txBody>
+          <a:bodyPr rtlCol="0" anchor="ctr"/>
+          <a:lstStyle/>
+          <a:p>
+            <a:pPr algn="ctr"/>
             <a:endParaRPr lang="es-MX"/>
           </a:p>
         </p:txBody>
       </p:sp>
+      <p:sp>
+        <p:nvSpPr>
+          <p:cNvPr id="14" name="Rectángulo: esquinas redondeadas 13">
+            <a:extLst>
+              <a:ext uri="{FF2B5EF4-FFF2-40B4-BE49-F238E27FC236}">
+                <a16:creationId xmlns:a16="http://schemas.microsoft.com/office/drawing/2014/main" id="{9519FCFE-EA6D-433D-BFBE-87BF4F57B06B}"/>
+              </a:ext>
+            </a:extLst>
+          </p:cNvPr>
+          <p:cNvSpPr/>
+          <p:nvPr/>
+        </p:nvSpPr>
+        <p:spPr>
+          <a:xfrm>
+            <a:off x="4208477" y="4139780"/>
+            <a:ext cx="3475839" cy="1048234"/>
+          </a:xfrm>
+          <a:prstGeom prst="roundRect">
+            <a:avLst/>
+          </a:prstGeom>
+        </p:spPr>
+        <p:style>
+          <a:lnRef idx="2">
+            <a:schemeClr val="dk1"/>
+          </a:lnRef>
+          <a:fillRef idx="1">
+            <a:schemeClr val="lt1"/>
+          </a:fillRef>
+          <a:effectRef idx="0">
+            <a:schemeClr val="dk1"/>
+          </a:effectRef>
+          <a:fontRef idx="minor">
+            <a:schemeClr val="dk1"/>
+          </a:fontRef>
+        </p:style>
+        <p:txBody>
+          <a:bodyPr rtlCol="0" anchor="ctr"/>
+          <a:lstStyle/>
+          <a:p>
+            <a:pPr algn="ctr"/>
+            <a:r>
+              <a:rPr lang="es-MX" dirty="0"/>
+              <a:t>Agregamos la descripción de la solución o lo que se ha hecho </a:t>
+            </a:r>
+          </a:p>
+        </p:txBody>
+      </p:sp>
+      <p:sp>
+        <p:nvSpPr>
+          <p:cNvPr id="15" name="Rectángulo: esquinas redondeadas 14">
+            <a:extLst>
+              <a:ext uri="{FF2B5EF4-FFF2-40B4-BE49-F238E27FC236}">
+                <a16:creationId xmlns:a16="http://schemas.microsoft.com/office/drawing/2014/main" id="{27CBAF84-076A-41FB-8774-8C0B87B0E145}"/>
+              </a:ext>
+            </a:extLst>
+          </p:cNvPr>
+          <p:cNvSpPr/>
+          <p:nvPr/>
+        </p:nvSpPr>
+        <p:spPr>
+          <a:xfrm>
+            <a:off x="4224762" y="5954239"/>
+            <a:ext cx="1166070" cy="343949"/>
+          </a:xfrm>
+          <a:prstGeom prst="roundRect">
+            <a:avLst/>
+          </a:prstGeom>
+        </p:spPr>
+        <p:style>
+          <a:lnRef idx="2">
+            <a:schemeClr val="accent1">
+              <a:shade val="50000"/>
+            </a:schemeClr>
+          </a:lnRef>
+          <a:fillRef idx="1">
+            <a:schemeClr val="accent1"/>
+          </a:fillRef>
+          <a:effectRef idx="0">
+            <a:schemeClr val="accent1"/>
+          </a:effectRef>
+          <a:fontRef idx="minor">
+            <a:schemeClr val="lt1"/>
+          </a:fontRef>
+        </p:style>
+        <p:txBody>
+          <a:bodyPr rtlCol="0" anchor="ctr"/>
+          <a:lstStyle/>
+          <a:p>
+            <a:pPr algn="ctr"/>
+            <a:r>
+              <a:rPr lang="es-MX" dirty="0"/>
+              <a:t>Agregar</a:t>
+            </a:r>
+          </a:p>
+        </p:txBody>
+      </p:sp>
+      <p:sp>
+        <p:nvSpPr>
+          <p:cNvPr id="16" name="Rectángulo: esquinas redondeadas 15">
+            <a:extLst>
+              <a:ext uri="{FF2B5EF4-FFF2-40B4-BE49-F238E27FC236}">
+                <a16:creationId xmlns:a16="http://schemas.microsoft.com/office/drawing/2014/main" id="{17CDC410-76AF-4427-B82E-D852CAD6FD80}"/>
+              </a:ext>
+            </a:extLst>
+          </p:cNvPr>
+          <p:cNvSpPr/>
+          <p:nvPr/>
+        </p:nvSpPr>
+        <p:spPr>
+          <a:xfrm>
+            <a:off x="4224762" y="5358743"/>
+            <a:ext cx="3459554" cy="418259"/>
+          </a:xfrm>
+          <a:prstGeom prst="roundRect">
+            <a:avLst/>
+          </a:prstGeom>
+        </p:spPr>
+        <p:style>
+          <a:lnRef idx="2">
+            <a:schemeClr val="dk1"/>
+          </a:lnRef>
+          <a:fillRef idx="1">
+            <a:schemeClr val="lt1"/>
+          </a:fillRef>
+          <a:effectRef idx="0">
+            <a:schemeClr val="dk1"/>
+          </a:effectRef>
+          <a:fontRef idx="minor">
+            <a:schemeClr val="dk1"/>
+          </a:fontRef>
+        </p:style>
+        <p:txBody>
+          <a:bodyPr rtlCol="0" anchor="ctr"/>
+          <a:lstStyle/>
+          <a:p>
+            <a:pPr algn="ctr"/>
+            <a:r>
+              <a:rPr lang="es-MX" dirty="0"/>
+              <a:t>Abierto / Cerrado</a:t>
+            </a:r>
+          </a:p>
+        </p:txBody>
+      </p:sp>
+      <p:sp>
+        <p:nvSpPr>
+          <p:cNvPr id="17" name="Triángulo isósceles 16">
+            <a:extLst>
+              <a:ext uri="{FF2B5EF4-FFF2-40B4-BE49-F238E27FC236}">
+                <a16:creationId xmlns:a16="http://schemas.microsoft.com/office/drawing/2014/main" id="{286D4E34-922F-4BBE-8A8A-324A084199A7}"/>
+              </a:ext>
+            </a:extLst>
+          </p:cNvPr>
+          <p:cNvSpPr/>
+          <p:nvPr/>
+        </p:nvSpPr>
+        <p:spPr>
+          <a:xfrm rot="10800000">
+            <a:off x="7351060" y="5481044"/>
+            <a:ext cx="276836" cy="209725"/>
+          </a:xfrm>
+          <a:prstGeom prst="triangle">
+            <a:avLst/>
+          </a:prstGeom>
+        </p:spPr>
+        <p:style>
+          <a:lnRef idx="1">
+            <a:schemeClr val="dk1"/>
+          </a:lnRef>
+          <a:fillRef idx="2">
+            <a:schemeClr val="dk1"/>
+          </a:fillRef>
+          <a:effectRef idx="1">
+            <a:schemeClr val="dk1"/>
+          </a:effectRef>
+          <a:fontRef idx="minor">
+            <a:schemeClr val="dk1"/>
+          </a:fontRef>
+        </p:style>
+        <p:txBody>
+          <a:bodyPr rtlCol="0" anchor="ctr"/>
+          <a:lstStyle/>
+          <a:p>
+            <a:pPr algn="ctr"/>
+            <a:endParaRPr lang="es-MX"/>
+          </a:p>
+        </p:txBody>
+      </p:sp>
+      <p:sp>
+        <p:nvSpPr>
+          <p:cNvPr id="18" name="CuadroTexto 17">
+            <a:extLst>
+              <a:ext uri="{FF2B5EF4-FFF2-40B4-BE49-F238E27FC236}">
+                <a16:creationId xmlns:a16="http://schemas.microsoft.com/office/drawing/2014/main" id="{B7418E1E-9555-4768-A0EE-765CD044970D}"/>
+              </a:ext>
+            </a:extLst>
+          </p:cNvPr>
+          <p:cNvSpPr txBox="1"/>
+          <p:nvPr/>
+        </p:nvSpPr>
+        <p:spPr>
+          <a:xfrm>
+            <a:off x="8621327" y="4080468"/>
+            <a:ext cx="3095537" cy="1323439"/>
+          </a:xfrm>
+          <a:prstGeom prst="rect">
+            <a:avLst/>
+          </a:prstGeom>
+        </p:spPr>
+        <p:style>
+          <a:lnRef idx="2">
+            <a:schemeClr val="accent1"/>
+          </a:lnRef>
+          <a:fillRef idx="1">
+            <a:schemeClr val="lt1"/>
+          </a:fillRef>
+          <a:effectRef idx="0">
+            <a:schemeClr val="accent1"/>
+          </a:effectRef>
+          <a:fontRef idx="minor">
+            <a:schemeClr val="dk1"/>
+          </a:fontRef>
+        </p:style>
+        <p:txBody>
+          <a:bodyPr wrap="square" rtlCol="0">
+            <a:spAutoFit/>
+          </a:bodyPr>
+          <a:lstStyle/>
+          <a:p>
+            <a:r>
+              <a:rPr lang="es-MX" sz="1600" dirty="0"/>
+              <a:t>Podemos dejar abierto el estado si es que solo hemos dado una solución provisional o cerrar definitivamente si estamos seguros de que se ha terminado</a:t>
+            </a:r>
+          </a:p>
+        </p:txBody>
+      </p:sp>
+      <p:cxnSp>
+        <p:nvCxnSpPr>
+          <p:cNvPr id="20" name="Conector recto de flecha 19">
+            <a:extLst>
+              <a:ext uri="{FF2B5EF4-FFF2-40B4-BE49-F238E27FC236}">
+                <a16:creationId xmlns:a16="http://schemas.microsoft.com/office/drawing/2014/main" id="{8BB11A8B-7F1C-4765-AB22-6A968ECCB98C}"/>
+              </a:ext>
+            </a:extLst>
+          </p:cNvPr>
+          <p:cNvCxnSpPr>
+            <a:stCxn id="12" idx="3"/>
+            <a:endCxn id="18" idx="1"/>
+          </p:cNvCxnSpPr>
+          <p:nvPr/>
+        </p:nvCxnSpPr>
+        <p:spPr>
+          <a:xfrm flipV="1">
+            <a:off x="7965760" y="4742188"/>
+            <a:ext cx="655567" cy="445827"/>
+          </a:xfrm>
+          <a:prstGeom prst="straightConnector1">
+            <a:avLst/>
+          </a:prstGeom>
+          <a:ln>
+            <a:tailEnd type="triangle"/>
+          </a:ln>
+        </p:spPr>
+        <p:style>
+          <a:lnRef idx="1">
+            <a:schemeClr val="accent1"/>
+          </a:lnRef>
+          <a:fillRef idx="0">
+            <a:schemeClr val="accent1"/>
+          </a:fillRef>
+          <a:effectRef idx="0">
+            <a:schemeClr val="accent1"/>
+          </a:effectRef>
+          <a:fontRef idx="minor">
+            <a:schemeClr val="tx1"/>
+          </a:fontRef>
+        </p:style>
+      </p:cxnSp>
     </p:spTree>
     <p:extLst>
       <p:ext uri="{BB962C8B-B14F-4D97-AF65-F5344CB8AC3E}">

</xml_diff>